<commit_message>
- More revisions - Added OLAM text
</commit_message>
<xml_diff>
--- a/HorizontalStaggering.pptx
+++ b/HorizontalStaggering.pptx
@@ -254,7 +254,7 @@
           <a:p>
             <a:fld id="{DD6B373E-C614-8644-A779-C2A8E6BF525E}" type="datetimeFigureOut">
               <a:rPr lang="en-US" smtClean="0"/>
-              <a:t>4/12/17</a:t>
+              <a:t>4/14/17</a:t>
             </a:fld>
             <a:endParaRPr lang="en-US"/>
           </a:p>
@@ -424,7 +424,7 @@
           <a:p>
             <a:fld id="{DD6B373E-C614-8644-A779-C2A8E6BF525E}" type="datetimeFigureOut">
               <a:rPr lang="en-US" smtClean="0"/>
-              <a:t>4/12/17</a:t>
+              <a:t>4/14/17</a:t>
             </a:fld>
             <a:endParaRPr lang="en-US"/>
           </a:p>
@@ -604,7 +604,7 @@
           <a:p>
             <a:fld id="{DD6B373E-C614-8644-A779-C2A8E6BF525E}" type="datetimeFigureOut">
               <a:rPr lang="en-US" smtClean="0"/>
-              <a:t>4/12/17</a:t>
+              <a:t>4/14/17</a:t>
             </a:fld>
             <a:endParaRPr lang="en-US"/>
           </a:p>
@@ -774,7 +774,7 @@
           <a:p>
             <a:fld id="{DD6B373E-C614-8644-A779-C2A8E6BF525E}" type="datetimeFigureOut">
               <a:rPr lang="en-US" smtClean="0"/>
-              <a:t>4/12/17</a:t>
+              <a:t>4/14/17</a:t>
             </a:fld>
             <a:endParaRPr lang="en-US"/>
           </a:p>
@@ -1018,7 +1018,7 @@
           <a:p>
             <a:fld id="{DD6B373E-C614-8644-A779-C2A8E6BF525E}" type="datetimeFigureOut">
               <a:rPr lang="en-US" smtClean="0"/>
-              <a:t>4/12/17</a:t>
+              <a:t>4/14/17</a:t>
             </a:fld>
             <a:endParaRPr lang="en-US"/>
           </a:p>
@@ -1250,7 +1250,7 @@
           <a:p>
             <a:fld id="{DD6B373E-C614-8644-A779-C2A8E6BF525E}" type="datetimeFigureOut">
               <a:rPr lang="en-US" smtClean="0"/>
-              <a:t>4/12/17</a:t>
+              <a:t>4/14/17</a:t>
             </a:fld>
             <a:endParaRPr lang="en-US"/>
           </a:p>
@@ -1617,7 +1617,7 @@
           <a:p>
             <a:fld id="{DD6B373E-C614-8644-A779-C2A8E6BF525E}" type="datetimeFigureOut">
               <a:rPr lang="en-US" smtClean="0"/>
-              <a:t>4/12/17</a:t>
+              <a:t>4/14/17</a:t>
             </a:fld>
             <a:endParaRPr lang="en-US"/>
           </a:p>
@@ -1735,7 +1735,7 @@
           <a:p>
             <a:fld id="{DD6B373E-C614-8644-A779-C2A8E6BF525E}" type="datetimeFigureOut">
               <a:rPr lang="en-US" smtClean="0"/>
-              <a:t>4/12/17</a:t>
+              <a:t>4/14/17</a:t>
             </a:fld>
             <a:endParaRPr lang="en-US"/>
           </a:p>
@@ -1830,7 +1830,7 @@
           <a:p>
             <a:fld id="{DD6B373E-C614-8644-A779-C2A8E6BF525E}" type="datetimeFigureOut">
               <a:rPr lang="en-US" smtClean="0"/>
-              <a:t>4/12/17</a:t>
+              <a:t>4/14/17</a:t>
             </a:fld>
             <a:endParaRPr lang="en-US"/>
           </a:p>
@@ -2107,7 +2107,7 @@
           <a:p>
             <a:fld id="{DD6B373E-C614-8644-A779-C2A8E6BF525E}" type="datetimeFigureOut">
               <a:rPr lang="en-US" smtClean="0"/>
-              <a:t>4/12/17</a:t>
+              <a:t>4/14/17</a:t>
             </a:fld>
             <a:endParaRPr lang="en-US"/>
           </a:p>
@@ -2364,7 +2364,7 @@
           <a:p>
             <a:fld id="{DD6B373E-C614-8644-A779-C2A8E6BF525E}" type="datetimeFigureOut">
               <a:rPr lang="en-US" smtClean="0"/>
-              <a:t>4/12/17</a:t>
+              <a:t>4/14/17</a:t>
             </a:fld>
             <a:endParaRPr lang="en-US"/>
           </a:p>
@@ -2577,7 +2577,7 @@
           <a:p>
             <a:fld id="{DD6B373E-C614-8644-A779-C2A8E6BF525E}" type="datetimeFigureOut">
               <a:rPr lang="en-US" smtClean="0"/>
-              <a:t>4/12/17</a:t>
+              <a:t>4/14/17</a:t>
             </a:fld>
             <a:endParaRPr lang="en-US"/>
           </a:p>
@@ -2982,497 +2982,176 @@
           <a:chExt cx="0" cy="0"/>
         </a:xfrm>
       </p:grpSpPr>
+      <p:cxnSp>
+        <p:nvCxnSpPr>
+          <p:cNvPr id="212" name="Straight Connector 211"/>
+          <p:cNvCxnSpPr/>
+          <p:nvPr/>
+        </p:nvCxnSpPr>
+        <p:spPr>
+          <a:xfrm>
+            <a:off x="580644" y="922890"/>
+            <a:ext cx="1097280" cy="0"/>
+          </a:xfrm>
+          <a:prstGeom prst="line">
+            <a:avLst/>
+          </a:prstGeom>
+          <a:ln w="19050">
+            <a:solidFill>
+              <a:schemeClr val="tx1"/>
+            </a:solidFill>
+          </a:ln>
+        </p:spPr>
+        <p:style>
+          <a:lnRef idx="1">
+            <a:schemeClr val="accent1"/>
+          </a:lnRef>
+          <a:fillRef idx="0">
+            <a:schemeClr val="accent1"/>
+          </a:fillRef>
+          <a:effectRef idx="0">
+            <a:schemeClr val="accent1"/>
+          </a:effectRef>
+          <a:fontRef idx="minor">
+            <a:schemeClr val="tx1"/>
+          </a:fontRef>
+        </p:style>
+      </p:cxnSp>
+      <p:cxnSp>
+        <p:nvCxnSpPr>
+          <p:cNvPr id="217" name="Straight Connector 216"/>
+          <p:cNvCxnSpPr/>
+          <p:nvPr/>
+        </p:nvCxnSpPr>
+        <p:spPr>
+          <a:xfrm>
+            <a:off x="580644" y="1610591"/>
+            <a:ext cx="1097280" cy="0"/>
+          </a:xfrm>
+          <a:prstGeom prst="line">
+            <a:avLst/>
+          </a:prstGeom>
+          <a:ln w="19050">
+            <a:solidFill>
+              <a:schemeClr val="tx1"/>
+            </a:solidFill>
+          </a:ln>
+        </p:spPr>
+        <p:style>
+          <a:lnRef idx="1">
+            <a:schemeClr val="accent1"/>
+          </a:lnRef>
+          <a:fillRef idx="0">
+            <a:schemeClr val="accent1"/>
+          </a:fillRef>
+          <a:effectRef idx="0">
+            <a:schemeClr val="accent1"/>
+          </a:effectRef>
+          <a:fontRef idx="minor">
+            <a:schemeClr val="tx1"/>
+          </a:fontRef>
+        </p:style>
+      </p:cxnSp>
+      <p:cxnSp>
+        <p:nvCxnSpPr>
+          <p:cNvPr id="219" name="Straight Connector 218"/>
+          <p:cNvCxnSpPr/>
+          <p:nvPr/>
+        </p:nvCxnSpPr>
+        <p:spPr>
+          <a:xfrm>
+            <a:off x="790330" y="653011"/>
+            <a:ext cx="0" cy="1244104"/>
+          </a:xfrm>
+          <a:prstGeom prst="line">
+            <a:avLst/>
+          </a:prstGeom>
+          <a:ln w="19050">
+            <a:solidFill>
+              <a:schemeClr val="tx1"/>
+            </a:solidFill>
+          </a:ln>
+        </p:spPr>
+        <p:style>
+          <a:lnRef idx="1">
+            <a:schemeClr val="accent1"/>
+          </a:lnRef>
+          <a:fillRef idx="0">
+            <a:schemeClr val="accent1"/>
+          </a:fillRef>
+          <a:effectRef idx="0">
+            <a:schemeClr val="accent1"/>
+          </a:effectRef>
+          <a:fontRef idx="minor">
+            <a:schemeClr val="tx1"/>
+          </a:fontRef>
+        </p:style>
+      </p:cxnSp>
+      <p:cxnSp>
+        <p:nvCxnSpPr>
+          <p:cNvPr id="221" name="Straight Connector 220"/>
+          <p:cNvCxnSpPr/>
+          <p:nvPr/>
+        </p:nvCxnSpPr>
+        <p:spPr>
+          <a:xfrm>
+            <a:off x="1478031" y="653011"/>
+            <a:ext cx="0" cy="1244104"/>
+          </a:xfrm>
+          <a:prstGeom prst="line">
+            <a:avLst/>
+          </a:prstGeom>
+          <a:ln w="19050">
+            <a:solidFill>
+              <a:schemeClr val="tx1"/>
+            </a:solidFill>
+          </a:ln>
+        </p:spPr>
+        <p:style>
+          <a:lnRef idx="1">
+            <a:schemeClr val="accent1"/>
+          </a:lnRef>
+          <a:fillRef idx="0">
+            <a:schemeClr val="accent1"/>
+          </a:fillRef>
+          <a:effectRef idx="0">
+            <a:schemeClr val="accent1"/>
+          </a:effectRef>
+          <a:fontRef idx="minor">
+            <a:schemeClr val="tx1"/>
+          </a:fontRef>
+        </p:style>
+      </p:cxnSp>
       <p:grpSp>
         <p:nvGrpSpPr>
-          <p:cNvPr id="92" name="Group 91"/>
+          <p:cNvPr id="62" name="Group 61"/>
           <p:cNvGrpSpPr/>
           <p:nvPr/>
         </p:nvGrpSpPr>
         <p:grpSpPr>
           <a:xfrm>
-            <a:off x="448887" y="199505"/>
-            <a:ext cx="2872122" cy="1697610"/>
-            <a:chOff x="448887" y="199505"/>
-            <a:chExt cx="2872122" cy="1697610"/>
+            <a:off x="1887610" y="727211"/>
+            <a:ext cx="1433399" cy="1169904"/>
+            <a:chOff x="2378593" y="226634"/>
+            <a:chExt cx="1137275" cy="928215"/>
           </a:xfrm>
         </p:grpSpPr>
-        <p:cxnSp>
-          <p:nvCxnSpPr>
-            <p:cNvPr id="212" name="Straight Connector 211"/>
-            <p:cNvCxnSpPr/>
-            <p:nvPr/>
-          </p:nvCxnSpPr>
-          <p:spPr>
-            <a:xfrm>
-              <a:off x="580644" y="922890"/>
-              <a:ext cx="1097280" cy="0"/>
-            </a:xfrm>
-            <a:prstGeom prst="line">
-              <a:avLst/>
-            </a:prstGeom>
-            <a:ln>
-              <a:solidFill>
-                <a:schemeClr val="tx1"/>
-              </a:solidFill>
-            </a:ln>
-          </p:spPr>
-          <p:style>
-            <a:lnRef idx="1">
-              <a:schemeClr val="accent1"/>
-            </a:lnRef>
-            <a:fillRef idx="0">
-              <a:schemeClr val="accent1"/>
-            </a:fillRef>
-            <a:effectRef idx="0">
-              <a:schemeClr val="accent1"/>
-            </a:effectRef>
-            <a:fontRef idx="minor">
-              <a:schemeClr val="tx1"/>
-            </a:fontRef>
-          </p:style>
-        </p:cxnSp>
-        <p:cxnSp>
-          <p:nvCxnSpPr>
-            <p:cNvPr id="217" name="Straight Connector 216"/>
-            <p:cNvCxnSpPr/>
-            <p:nvPr/>
-          </p:nvCxnSpPr>
-          <p:spPr>
-            <a:xfrm>
-              <a:off x="580644" y="1610591"/>
-              <a:ext cx="1097280" cy="0"/>
-            </a:xfrm>
-            <a:prstGeom prst="line">
-              <a:avLst/>
-            </a:prstGeom>
-            <a:ln>
-              <a:solidFill>
-                <a:schemeClr val="tx1"/>
-              </a:solidFill>
-            </a:ln>
-          </p:spPr>
-          <p:style>
-            <a:lnRef idx="1">
-              <a:schemeClr val="accent1"/>
-            </a:lnRef>
-            <a:fillRef idx="0">
-              <a:schemeClr val="accent1"/>
-            </a:fillRef>
-            <a:effectRef idx="0">
-              <a:schemeClr val="accent1"/>
-            </a:effectRef>
-            <a:fontRef idx="minor">
-              <a:schemeClr val="tx1"/>
-            </a:fontRef>
-          </p:style>
-        </p:cxnSp>
-        <p:cxnSp>
-          <p:nvCxnSpPr>
-            <p:cNvPr id="219" name="Straight Connector 218"/>
-            <p:cNvCxnSpPr/>
-            <p:nvPr/>
-          </p:nvCxnSpPr>
-          <p:spPr>
-            <a:xfrm>
-              <a:off x="790330" y="653011"/>
-              <a:ext cx="0" cy="1244104"/>
-            </a:xfrm>
-            <a:prstGeom prst="line">
-              <a:avLst/>
-            </a:prstGeom>
-            <a:ln>
-              <a:solidFill>
-                <a:schemeClr val="tx1"/>
-              </a:solidFill>
-            </a:ln>
-          </p:spPr>
-          <p:style>
-            <a:lnRef idx="1">
-              <a:schemeClr val="accent1"/>
-            </a:lnRef>
-            <a:fillRef idx="0">
-              <a:schemeClr val="accent1"/>
-            </a:fillRef>
-            <a:effectRef idx="0">
-              <a:schemeClr val="accent1"/>
-            </a:effectRef>
-            <a:fontRef idx="minor">
-              <a:schemeClr val="tx1"/>
-            </a:fontRef>
-          </p:style>
-        </p:cxnSp>
-        <p:cxnSp>
-          <p:nvCxnSpPr>
-            <p:cNvPr id="221" name="Straight Connector 220"/>
-            <p:cNvCxnSpPr/>
-            <p:nvPr/>
-          </p:nvCxnSpPr>
-          <p:spPr>
-            <a:xfrm>
-              <a:off x="1478031" y="653011"/>
-              <a:ext cx="0" cy="1244104"/>
-            </a:xfrm>
-            <a:prstGeom prst="line">
-              <a:avLst/>
-            </a:prstGeom>
-            <a:ln>
-              <a:solidFill>
-                <a:schemeClr val="tx1"/>
-              </a:solidFill>
-            </a:ln>
-          </p:spPr>
-          <p:style>
-            <a:lnRef idx="1">
-              <a:schemeClr val="accent1"/>
-            </a:lnRef>
-            <a:fillRef idx="0">
-              <a:schemeClr val="accent1"/>
-            </a:fillRef>
-            <a:effectRef idx="0">
-              <a:schemeClr val="accent1"/>
-            </a:effectRef>
-            <a:fontRef idx="minor">
-              <a:schemeClr val="tx1"/>
-            </a:fontRef>
-          </p:style>
-        </p:cxnSp>
-        <p:grpSp>
-          <p:nvGrpSpPr>
-            <p:cNvPr id="62" name="Group 61"/>
-            <p:cNvGrpSpPr/>
-            <p:nvPr/>
-          </p:nvGrpSpPr>
-          <p:grpSpPr>
-            <a:xfrm>
-              <a:off x="1887610" y="727211"/>
-              <a:ext cx="1433399" cy="1169904"/>
-              <a:chOff x="2378593" y="226634"/>
-              <a:chExt cx="1137275" cy="928215"/>
-            </a:xfrm>
-          </p:grpSpPr>
-          <p:sp>
-            <p:nvSpPr>
-              <p:cNvPr id="22" name="Hexagon 21"/>
-              <p:cNvSpPr/>
-              <p:nvPr/>
-            </p:nvSpPr>
-            <p:spPr>
-              <a:xfrm>
-                <a:off x="2586440" y="382147"/>
-                <a:ext cx="721581" cy="622052"/>
-              </a:xfrm>
-              <a:prstGeom prst="hexagon">
-                <a:avLst/>
-              </a:prstGeom>
-              <a:noFill/>
-              <a:ln w="6350">
-                <a:solidFill>
-                  <a:schemeClr val="tx1"/>
-                </a:solidFill>
-              </a:ln>
-            </p:spPr>
-            <p:style>
-              <a:lnRef idx="2">
-                <a:schemeClr val="accent1">
-                  <a:shade val="50000"/>
-                </a:schemeClr>
-              </a:lnRef>
-              <a:fillRef idx="1">
-                <a:schemeClr val="accent1"/>
-              </a:fillRef>
-              <a:effectRef idx="0">
-                <a:schemeClr val="accent1"/>
-              </a:effectRef>
-              <a:fontRef idx="minor">
-                <a:schemeClr val="lt1"/>
-              </a:fontRef>
-            </p:style>
-            <p:txBody>
-              <a:bodyPr rtlCol="0" anchor="ctr"/>
-              <a:lstStyle/>
-              <a:p>
-                <a:pPr algn="ctr"/>
-                <a:endParaRPr lang="en-US"/>
-              </a:p>
-            </p:txBody>
-          </p:sp>
-          <p:cxnSp>
-            <p:nvCxnSpPr>
-              <p:cNvPr id="24" name="Straight Connector 23"/>
-              <p:cNvCxnSpPr>
-                <a:stCxn id="22" idx="4"/>
-              </p:cNvCxnSpPr>
-              <p:nvPr/>
-            </p:nvCxnSpPr>
-            <p:spPr>
-              <a:xfrm flipH="1" flipV="1">
-                <a:off x="2665660" y="226634"/>
-                <a:ext cx="76293" cy="155513"/>
-              </a:xfrm>
-              <a:prstGeom prst="line">
-                <a:avLst/>
-              </a:prstGeom>
-              <a:ln w="6350">
-                <a:solidFill>
-                  <a:schemeClr val="tx1"/>
-                </a:solidFill>
-              </a:ln>
-            </p:spPr>
-            <p:style>
-              <a:lnRef idx="1">
-                <a:schemeClr val="accent1"/>
-              </a:lnRef>
-              <a:fillRef idx="0">
-                <a:schemeClr val="accent1"/>
-              </a:fillRef>
-              <a:effectRef idx="0">
-                <a:schemeClr val="accent1"/>
-              </a:effectRef>
-              <a:fontRef idx="minor">
-                <a:schemeClr val="tx1"/>
-              </a:fontRef>
-            </p:style>
-          </p:cxnSp>
-          <p:cxnSp>
-            <p:nvCxnSpPr>
-              <p:cNvPr id="26" name="Straight Connector 25"/>
-              <p:cNvCxnSpPr/>
-              <p:nvPr/>
-            </p:nvCxnSpPr>
-            <p:spPr>
-              <a:xfrm flipV="1">
-                <a:off x="3149575" y="226634"/>
-                <a:ext cx="77756" cy="155514"/>
-              </a:xfrm>
-              <a:prstGeom prst="line">
-                <a:avLst/>
-              </a:prstGeom>
-              <a:ln w="6350">
-                <a:solidFill>
-                  <a:schemeClr val="tx1"/>
-                </a:solidFill>
-              </a:ln>
-            </p:spPr>
-            <p:style>
-              <a:lnRef idx="1">
-                <a:schemeClr val="accent1"/>
-              </a:lnRef>
-              <a:fillRef idx="0">
-                <a:schemeClr val="accent1"/>
-              </a:fillRef>
-              <a:effectRef idx="0">
-                <a:schemeClr val="accent1"/>
-              </a:effectRef>
-              <a:fontRef idx="minor">
-                <a:schemeClr val="tx1"/>
-              </a:fontRef>
-            </p:style>
-          </p:cxnSp>
-          <p:cxnSp>
-            <p:nvCxnSpPr>
-              <p:cNvPr id="28" name="Straight Connector 27"/>
-              <p:cNvCxnSpPr>
-                <a:stCxn id="22" idx="0"/>
-              </p:cNvCxnSpPr>
-              <p:nvPr/>
-            </p:nvCxnSpPr>
-            <p:spPr>
-              <a:xfrm>
-                <a:off x="3308021" y="693173"/>
-                <a:ext cx="207847" cy="0"/>
-              </a:xfrm>
-              <a:prstGeom prst="line">
-                <a:avLst/>
-              </a:prstGeom>
-              <a:ln w="6350">
-                <a:solidFill>
-                  <a:schemeClr val="tx1"/>
-                </a:solidFill>
-              </a:ln>
-            </p:spPr>
-            <p:style>
-              <a:lnRef idx="1">
-                <a:schemeClr val="accent1"/>
-              </a:lnRef>
-              <a:fillRef idx="0">
-                <a:schemeClr val="accent1"/>
-              </a:fillRef>
-              <a:effectRef idx="0">
-                <a:schemeClr val="accent1"/>
-              </a:effectRef>
-              <a:fontRef idx="minor">
-                <a:schemeClr val="tx1"/>
-              </a:fontRef>
-            </p:style>
-          </p:cxnSp>
-          <p:cxnSp>
-            <p:nvCxnSpPr>
-              <p:cNvPr id="30" name="Straight Connector 29"/>
-              <p:cNvCxnSpPr>
-                <a:stCxn id="22" idx="1"/>
-              </p:cNvCxnSpPr>
-              <p:nvPr/>
-            </p:nvCxnSpPr>
-            <p:spPr>
-              <a:xfrm>
-                <a:off x="3152508" y="1004199"/>
-                <a:ext cx="75324" cy="150650"/>
-              </a:xfrm>
-              <a:prstGeom prst="line">
-                <a:avLst/>
-              </a:prstGeom>
-              <a:ln w="6350">
-                <a:solidFill>
-                  <a:schemeClr val="tx1"/>
-                </a:solidFill>
-              </a:ln>
-            </p:spPr>
-            <p:style>
-              <a:lnRef idx="1">
-                <a:schemeClr val="accent1"/>
-              </a:lnRef>
-              <a:fillRef idx="0">
-                <a:schemeClr val="accent1"/>
-              </a:fillRef>
-              <a:effectRef idx="0">
-                <a:schemeClr val="accent1"/>
-              </a:effectRef>
-              <a:fontRef idx="minor">
-                <a:schemeClr val="tx1"/>
-              </a:fontRef>
-            </p:style>
-          </p:cxnSp>
-          <p:cxnSp>
-            <p:nvCxnSpPr>
-              <p:cNvPr id="32" name="Straight Connector 31"/>
-              <p:cNvCxnSpPr>
-                <a:stCxn id="22" idx="2"/>
-              </p:cNvCxnSpPr>
-              <p:nvPr/>
-            </p:nvCxnSpPr>
-            <p:spPr>
-              <a:xfrm flipH="1">
-                <a:off x="2671556" y="1004199"/>
-                <a:ext cx="70397" cy="150650"/>
-              </a:xfrm>
-              <a:prstGeom prst="line">
-                <a:avLst/>
-              </a:prstGeom>
-              <a:ln w="6350">
-                <a:solidFill>
-                  <a:schemeClr val="tx1"/>
-                </a:solidFill>
-              </a:ln>
-            </p:spPr>
-            <p:style>
-              <a:lnRef idx="1">
-                <a:schemeClr val="accent1"/>
-              </a:lnRef>
-              <a:fillRef idx="0">
-                <a:schemeClr val="accent1"/>
-              </a:fillRef>
-              <a:effectRef idx="0">
-                <a:schemeClr val="accent1"/>
-              </a:effectRef>
-              <a:fontRef idx="minor">
-                <a:schemeClr val="tx1"/>
-              </a:fontRef>
-            </p:style>
-          </p:cxnSp>
-          <p:cxnSp>
-            <p:nvCxnSpPr>
-              <p:cNvPr id="34" name="Straight Connector 33"/>
-              <p:cNvCxnSpPr>
-                <a:stCxn id="22" idx="3"/>
-              </p:cNvCxnSpPr>
-              <p:nvPr/>
-            </p:nvCxnSpPr>
-            <p:spPr>
-              <a:xfrm flipH="1">
-                <a:off x="2378593" y="693173"/>
-                <a:ext cx="207847" cy="0"/>
-              </a:xfrm>
-              <a:prstGeom prst="line">
-                <a:avLst/>
-              </a:prstGeom>
-              <a:ln w="6350">
-                <a:solidFill>
-                  <a:schemeClr val="tx1"/>
-                </a:solidFill>
-              </a:ln>
-            </p:spPr>
-            <p:style>
-              <a:lnRef idx="1">
-                <a:schemeClr val="accent1"/>
-              </a:lnRef>
-              <a:fillRef idx="0">
-                <a:schemeClr val="accent1"/>
-              </a:fillRef>
-              <a:effectRef idx="0">
-                <a:schemeClr val="accent1"/>
-              </a:effectRef>
-              <a:fontRef idx="minor">
-                <a:schemeClr val="tx1"/>
-              </a:fontRef>
-            </p:style>
-          </p:cxnSp>
-        </p:grpSp>
         <p:sp>
           <p:nvSpPr>
-            <p:cNvPr id="63" name="TextBox 62"/>
-            <p:cNvSpPr txBox="1"/>
-            <p:nvPr/>
-          </p:nvSpPr>
-          <p:spPr>
-            <a:xfrm>
-              <a:off x="448887" y="199505"/>
-              <a:ext cx="1896695" cy="307777"/>
-            </a:xfrm>
-            <a:prstGeom prst="rect">
-              <a:avLst/>
-            </a:prstGeom>
-            <a:noFill/>
-          </p:spPr>
-          <p:txBody>
-            <a:bodyPr wrap="square" rtlCol="0">
-              <a:spAutoFit/>
-            </a:bodyPr>
-            <a:lstStyle/>
-            <a:p>
-              <a:r>
-                <a:rPr lang="en-US" sz="1400" dirty="0" smtClean="0">
-                  <a:latin typeface="Times" charset="0"/>
-                  <a:ea typeface="Times" charset="0"/>
-                  <a:cs typeface="Times" charset="0"/>
-                </a:rPr>
-                <a:t>(a) A-grid Staggering</a:t>
-              </a:r>
-              <a:endParaRPr lang="en-US" sz="1400" dirty="0">
-                <a:latin typeface="Times" charset="0"/>
-                <a:ea typeface="Times" charset="0"/>
-                <a:cs typeface="Times" charset="0"/>
-              </a:endParaRPr>
-            </a:p>
-          </p:txBody>
-        </p:sp>
-        <p:sp>
-          <p:nvSpPr>
-            <p:cNvPr id="72" name="Oval 71"/>
+            <p:cNvPr id="22" name="Hexagon 21"/>
             <p:cNvSpPr/>
             <p:nvPr/>
           </p:nvSpPr>
           <p:spPr>
             <a:xfrm>
-              <a:off x="1080147" y="1212707"/>
-              <a:ext cx="108066" cy="108066"/>
+              <a:off x="2586440" y="382147"/>
+              <a:ext cx="721581" cy="622052"/>
             </a:xfrm>
-            <a:prstGeom prst="ellipse">
+            <a:prstGeom prst="hexagon">
               <a:avLst/>
             </a:prstGeom>
-            <a:solidFill>
-              <a:schemeClr val="bg2"/>
-            </a:solidFill>
-            <a:ln>
+            <a:noFill/>
+            <a:ln w="19050">
               <a:solidFill>
                 <a:schemeClr val="tx1"/>
               </a:solidFill>
@@ -3503,24 +3182,723 @@
             </a:p>
           </p:txBody>
         </p:sp>
+        <p:cxnSp>
+          <p:nvCxnSpPr>
+            <p:cNvPr id="24" name="Straight Connector 23"/>
+            <p:cNvCxnSpPr>
+              <a:stCxn id="22" idx="4"/>
+            </p:cNvCxnSpPr>
+            <p:nvPr/>
+          </p:nvCxnSpPr>
+          <p:spPr>
+            <a:xfrm flipH="1" flipV="1">
+              <a:off x="2665660" y="226634"/>
+              <a:ext cx="76293" cy="155513"/>
+            </a:xfrm>
+            <a:prstGeom prst="line">
+              <a:avLst/>
+            </a:prstGeom>
+            <a:ln w="19050">
+              <a:solidFill>
+                <a:schemeClr val="tx1"/>
+              </a:solidFill>
+            </a:ln>
+          </p:spPr>
+          <p:style>
+            <a:lnRef idx="1">
+              <a:schemeClr val="accent1"/>
+            </a:lnRef>
+            <a:fillRef idx="0">
+              <a:schemeClr val="accent1"/>
+            </a:fillRef>
+            <a:effectRef idx="0">
+              <a:schemeClr val="accent1"/>
+            </a:effectRef>
+            <a:fontRef idx="minor">
+              <a:schemeClr val="tx1"/>
+            </a:fontRef>
+          </p:style>
+        </p:cxnSp>
+        <p:cxnSp>
+          <p:nvCxnSpPr>
+            <p:cNvPr id="26" name="Straight Connector 25"/>
+            <p:cNvCxnSpPr/>
+            <p:nvPr/>
+          </p:nvCxnSpPr>
+          <p:spPr>
+            <a:xfrm flipV="1">
+              <a:off x="3149575" y="226634"/>
+              <a:ext cx="77756" cy="155514"/>
+            </a:xfrm>
+            <a:prstGeom prst="line">
+              <a:avLst/>
+            </a:prstGeom>
+            <a:ln w="19050">
+              <a:solidFill>
+                <a:schemeClr val="tx1"/>
+              </a:solidFill>
+            </a:ln>
+          </p:spPr>
+          <p:style>
+            <a:lnRef idx="1">
+              <a:schemeClr val="accent1"/>
+            </a:lnRef>
+            <a:fillRef idx="0">
+              <a:schemeClr val="accent1"/>
+            </a:fillRef>
+            <a:effectRef idx="0">
+              <a:schemeClr val="accent1"/>
+            </a:effectRef>
+            <a:fontRef idx="minor">
+              <a:schemeClr val="tx1"/>
+            </a:fontRef>
+          </p:style>
+        </p:cxnSp>
+        <p:cxnSp>
+          <p:nvCxnSpPr>
+            <p:cNvPr id="28" name="Straight Connector 27"/>
+            <p:cNvCxnSpPr>
+              <a:stCxn id="22" idx="0"/>
+            </p:cNvCxnSpPr>
+            <p:nvPr/>
+          </p:nvCxnSpPr>
+          <p:spPr>
+            <a:xfrm>
+              <a:off x="3308021" y="693173"/>
+              <a:ext cx="207847" cy="0"/>
+            </a:xfrm>
+            <a:prstGeom prst="line">
+              <a:avLst/>
+            </a:prstGeom>
+            <a:ln w="19050">
+              <a:solidFill>
+                <a:schemeClr val="tx1"/>
+              </a:solidFill>
+            </a:ln>
+          </p:spPr>
+          <p:style>
+            <a:lnRef idx="1">
+              <a:schemeClr val="accent1"/>
+            </a:lnRef>
+            <a:fillRef idx="0">
+              <a:schemeClr val="accent1"/>
+            </a:fillRef>
+            <a:effectRef idx="0">
+              <a:schemeClr val="accent1"/>
+            </a:effectRef>
+            <a:fontRef idx="minor">
+              <a:schemeClr val="tx1"/>
+            </a:fontRef>
+          </p:style>
+        </p:cxnSp>
+        <p:cxnSp>
+          <p:nvCxnSpPr>
+            <p:cNvPr id="30" name="Straight Connector 29"/>
+            <p:cNvCxnSpPr>
+              <a:stCxn id="22" idx="1"/>
+            </p:cNvCxnSpPr>
+            <p:nvPr/>
+          </p:nvCxnSpPr>
+          <p:spPr>
+            <a:xfrm>
+              <a:off x="3152508" y="1004199"/>
+              <a:ext cx="75324" cy="150650"/>
+            </a:xfrm>
+            <a:prstGeom prst="line">
+              <a:avLst/>
+            </a:prstGeom>
+            <a:ln w="19050">
+              <a:solidFill>
+                <a:schemeClr val="tx1"/>
+              </a:solidFill>
+            </a:ln>
+          </p:spPr>
+          <p:style>
+            <a:lnRef idx="1">
+              <a:schemeClr val="accent1"/>
+            </a:lnRef>
+            <a:fillRef idx="0">
+              <a:schemeClr val="accent1"/>
+            </a:fillRef>
+            <a:effectRef idx="0">
+              <a:schemeClr val="accent1"/>
+            </a:effectRef>
+            <a:fontRef idx="minor">
+              <a:schemeClr val="tx1"/>
+            </a:fontRef>
+          </p:style>
+        </p:cxnSp>
+        <p:cxnSp>
+          <p:nvCxnSpPr>
+            <p:cNvPr id="32" name="Straight Connector 31"/>
+            <p:cNvCxnSpPr>
+              <a:stCxn id="22" idx="2"/>
+            </p:cNvCxnSpPr>
+            <p:nvPr/>
+          </p:nvCxnSpPr>
+          <p:spPr>
+            <a:xfrm flipH="1">
+              <a:off x="2671556" y="1004199"/>
+              <a:ext cx="70397" cy="150650"/>
+            </a:xfrm>
+            <a:prstGeom prst="line">
+              <a:avLst/>
+            </a:prstGeom>
+            <a:ln w="19050">
+              <a:solidFill>
+                <a:schemeClr val="tx1"/>
+              </a:solidFill>
+            </a:ln>
+          </p:spPr>
+          <p:style>
+            <a:lnRef idx="1">
+              <a:schemeClr val="accent1"/>
+            </a:lnRef>
+            <a:fillRef idx="0">
+              <a:schemeClr val="accent1"/>
+            </a:fillRef>
+            <a:effectRef idx="0">
+              <a:schemeClr val="accent1"/>
+            </a:effectRef>
+            <a:fontRef idx="minor">
+              <a:schemeClr val="tx1"/>
+            </a:fontRef>
+          </p:style>
+        </p:cxnSp>
+        <p:cxnSp>
+          <p:nvCxnSpPr>
+            <p:cNvPr id="34" name="Straight Connector 33"/>
+            <p:cNvCxnSpPr>
+              <a:stCxn id="22" idx="3"/>
+            </p:cNvCxnSpPr>
+            <p:nvPr/>
+          </p:nvCxnSpPr>
+          <p:spPr>
+            <a:xfrm flipH="1">
+              <a:off x="2378593" y="693173"/>
+              <a:ext cx="207847" cy="0"/>
+            </a:xfrm>
+            <a:prstGeom prst="line">
+              <a:avLst/>
+            </a:prstGeom>
+            <a:ln w="19050">
+              <a:solidFill>
+                <a:schemeClr val="tx1"/>
+              </a:solidFill>
+            </a:ln>
+          </p:spPr>
+          <p:style>
+            <a:lnRef idx="1">
+              <a:schemeClr val="accent1"/>
+            </a:lnRef>
+            <a:fillRef idx="0">
+              <a:schemeClr val="accent1"/>
+            </a:fillRef>
+            <a:effectRef idx="0">
+              <a:schemeClr val="accent1"/>
+            </a:effectRef>
+            <a:fontRef idx="minor">
+              <a:schemeClr val="tx1"/>
+            </a:fontRef>
+          </p:style>
+        </p:cxnSp>
+      </p:grpSp>
+      <p:sp>
+        <p:nvSpPr>
+          <p:cNvPr id="63" name="TextBox 62"/>
+          <p:cNvSpPr txBox="1"/>
+          <p:nvPr/>
+        </p:nvSpPr>
+        <p:spPr>
+          <a:xfrm>
+            <a:off x="448887" y="199505"/>
+            <a:ext cx="1896695" cy="307777"/>
+          </a:xfrm>
+          <a:prstGeom prst="rect">
+            <a:avLst/>
+          </a:prstGeom>
+          <a:noFill/>
+        </p:spPr>
+        <p:txBody>
+          <a:bodyPr wrap="square" rtlCol="0">
+            <a:spAutoFit/>
+          </a:bodyPr>
+          <a:lstStyle/>
+          <a:p>
+            <a:r>
+              <a:rPr lang="en-US" sz="1400" dirty="0" smtClean="0">
+                <a:latin typeface="Times" charset="0"/>
+                <a:ea typeface="Times" charset="0"/>
+                <a:cs typeface="Times" charset="0"/>
+              </a:rPr>
+              <a:t>(a) A-grid Staggering</a:t>
+            </a:r>
+            <a:endParaRPr lang="en-US" sz="1400" dirty="0">
+              <a:latin typeface="Times" charset="0"/>
+              <a:ea typeface="Times" charset="0"/>
+              <a:cs typeface="Times" charset="0"/>
+            </a:endParaRPr>
+          </a:p>
+        </p:txBody>
+      </p:sp>
+      <p:sp>
+        <p:nvSpPr>
+          <p:cNvPr id="72" name="Oval 71"/>
+          <p:cNvSpPr/>
+          <p:nvPr/>
+        </p:nvSpPr>
+        <p:spPr>
+          <a:xfrm>
+            <a:off x="1080147" y="1212707"/>
+            <a:ext cx="108066" cy="108066"/>
+          </a:xfrm>
+          <a:prstGeom prst="ellipse">
+            <a:avLst/>
+          </a:prstGeom>
+          <a:solidFill>
+            <a:schemeClr val="bg2"/>
+          </a:solidFill>
+          <a:ln>
+            <a:solidFill>
+              <a:schemeClr val="tx1"/>
+            </a:solidFill>
+          </a:ln>
+        </p:spPr>
+        <p:style>
+          <a:lnRef idx="2">
+            <a:schemeClr val="accent1">
+              <a:shade val="50000"/>
+            </a:schemeClr>
+          </a:lnRef>
+          <a:fillRef idx="1">
+            <a:schemeClr val="accent1"/>
+          </a:fillRef>
+          <a:effectRef idx="0">
+            <a:schemeClr val="accent1"/>
+          </a:effectRef>
+          <a:fontRef idx="minor">
+            <a:schemeClr val="lt1"/>
+          </a:fontRef>
+        </p:style>
+        <p:txBody>
+          <a:bodyPr rtlCol="0" anchor="ctr"/>
+          <a:lstStyle/>
+          <a:p>
+            <a:pPr algn="ctr"/>
+            <a:endParaRPr lang="en-US"/>
+          </a:p>
+        </p:txBody>
+      </p:sp>
+      <p:sp>
+        <p:nvSpPr>
+          <p:cNvPr id="114" name="Oval 113"/>
+          <p:cNvSpPr/>
+          <p:nvPr/>
+        </p:nvSpPr>
+        <p:spPr>
+          <a:xfrm>
+            <a:off x="2550276" y="1256507"/>
+            <a:ext cx="108066" cy="108066"/>
+          </a:xfrm>
+          <a:prstGeom prst="ellipse">
+            <a:avLst/>
+          </a:prstGeom>
+          <a:solidFill>
+            <a:schemeClr val="bg2"/>
+          </a:solidFill>
+          <a:ln>
+            <a:solidFill>
+              <a:schemeClr val="tx1"/>
+            </a:solidFill>
+          </a:ln>
+        </p:spPr>
+        <p:style>
+          <a:lnRef idx="2">
+            <a:schemeClr val="accent1">
+              <a:shade val="50000"/>
+            </a:schemeClr>
+          </a:lnRef>
+          <a:fillRef idx="1">
+            <a:schemeClr val="accent1"/>
+          </a:fillRef>
+          <a:effectRef idx="0">
+            <a:schemeClr val="accent1"/>
+          </a:effectRef>
+          <a:fontRef idx="minor">
+            <a:schemeClr val="lt1"/>
+          </a:fontRef>
+        </p:style>
+        <p:txBody>
+          <a:bodyPr rtlCol="0" anchor="ctr"/>
+          <a:lstStyle/>
+          <a:p>
+            <a:pPr algn="ctr"/>
+            <a:endParaRPr lang="en-US"/>
+          </a:p>
+        </p:txBody>
+      </p:sp>
+      <p:pic>
+        <p:nvPicPr>
+          <p:cNvPr id="76" name="Picture 75"/>
+          <p:cNvPicPr>
+            <a:picLocks noChangeAspect="1"/>
+          </p:cNvPicPr>
+          <p:nvPr/>
+        </p:nvPicPr>
+        <p:blipFill>
+          <a:blip r:embed="rId2"/>
+          <a:stretch>
+            <a:fillRect/>
+          </a:stretch>
+        </p:blipFill>
+        <p:spPr>
+          <a:xfrm>
+            <a:off x="892881" y="1416332"/>
+            <a:ext cx="482600" cy="139700"/>
+          </a:xfrm>
+          <a:prstGeom prst="rect">
+            <a:avLst/>
+          </a:prstGeom>
+        </p:spPr>
+      </p:pic>
+      <p:pic>
+        <p:nvPicPr>
+          <p:cNvPr id="119" name="Picture 118"/>
+          <p:cNvPicPr>
+            <a:picLocks noChangeAspect="1"/>
+          </p:cNvPicPr>
+          <p:nvPr/>
+        </p:nvPicPr>
+        <p:blipFill>
+          <a:blip r:embed="rId2"/>
+          <a:stretch>
+            <a:fillRect/>
+          </a:stretch>
+        </p:blipFill>
+        <p:spPr>
+          <a:xfrm>
+            <a:off x="2370466" y="1416332"/>
+            <a:ext cx="482600" cy="139700"/>
+          </a:xfrm>
+          <a:prstGeom prst="rect">
+            <a:avLst/>
+          </a:prstGeom>
+        </p:spPr>
+      </p:pic>
+      <p:cxnSp>
+        <p:nvCxnSpPr>
+          <p:cNvPr id="160" name="Straight Arrow Connector 159"/>
+          <p:cNvCxnSpPr/>
+          <p:nvPr/>
+        </p:nvCxnSpPr>
+        <p:spPr>
+          <a:xfrm flipH="1" flipV="1">
+            <a:off x="2604151" y="1097989"/>
+            <a:ext cx="0" cy="155448"/>
+          </a:xfrm>
+          <a:prstGeom prst="straightConnector1">
+            <a:avLst/>
+          </a:prstGeom>
+          <a:ln w="12700">
+            <a:solidFill>
+              <a:schemeClr val="tx1"/>
+            </a:solidFill>
+            <a:tailEnd type="triangle"/>
+          </a:ln>
+        </p:spPr>
+        <p:style>
+          <a:lnRef idx="1">
+            <a:schemeClr val="accent1"/>
+          </a:lnRef>
+          <a:fillRef idx="0">
+            <a:schemeClr val="accent1"/>
+          </a:fillRef>
+          <a:effectRef idx="0">
+            <a:schemeClr val="accent1"/>
+          </a:effectRef>
+          <a:fontRef idx="minor">
+            <a:schemeClr val="tx1"/>
+          </a:fontRef>
+        </p:style>
+      </p:cxnSp>
+      <p:cxnSp>
+        <p:nvCxnSpPr>
+          <p:cNvPr id="161" name="Straight Arrow Connector 160"/>
+          <p:cNvCxnSpPr/>
+          <p:nvPr/>
+        </p:nvCxnSpPr>
+        <p:spPr>
+          <a:xfrm>
+            <a:off x="2658342" y="1310540"/>
+            <a:ext cx="154853" cy="0"/>
+          </a:xfrm>
+          <a:prstGeom prst="straightConnector1">
+            <a:avLst/>
+          </a:prstGeom>
+          <a:ln w="12700">
+            <a:solidFill>
+              <a:schemeClr val="tx1"/>
+            </a:solidFill>
+            <a:tailEnd type="triangle"/>
+          </a:ln>
+        </p:spPr>
+        <p:style>
+          <a:lnRef idx="1">
+            <a:schemeClr val="accent1"/>
+          </a:lnRef>
+          <a:fillRef idx="0">
+            <a:schemeClr val="accent1"/>
+          </a:fillRef>
+          <a:effectRef idx="0">
+            <a:schemeClr val="accent1"/>
+          </a:effectRef>
+          <a:fontRef idx="minor">
+            <a:schemeClr val="tx1"/>
+          </a:fontRef>
+        </p:style>
+      </p:cxnSp>
+      <p:cxnSp>
+        <p:nvCxnSpPr>
+          <p:cNvPr id="162" name="Straight Arrow Connector 161"/>
+          <p:cNvCxnSpPr/>
+          <p:nvPr/>
+        </p:nvCxnSpPr>
+        <p:spPr>
+          <a:xfrm flipH="1" flipV="1">
+            <a:off x="1134022" y="1052379"/>
+            <a:ext cx="0" cy="155448"/>
+          </a:xfrm>
+          <a:prstGeom prst="straightConnector1">
+            <a:avLst/>
+          </a:prstGeom>
+          <a:ln w="12700">
+            <a:solidFill>
+              <a:schemeClr val="tx1"/>
+            </a:solidFill>
+            <a:tailEnd type="triangle"/>
+          </a:ln>
+        </p:spPr>
+        <p:style>
+          <a:lnRef idx="1">
+            <a:schemeClr val="accent1"/>
+          </a:lnRef>
+          <a:fillRef idx="0">
+            <a:schemeClr val="accent1"/>
+          </a:fillRef>
+          <a:effectRef idx="0">
+            <a:schemeClr val="accent1"/>
+          </a:effectRef>
+          <a:fontRef idx="minor">
+            <a:schemeClr val="tx1"/>
+          </a:fontRef>
+        </p:style>
+      </p:cxnSp>
+      <p:cxnSp>
+        <p:nvCxnSpPr>
+          <p:cNvPr id="163" name="Straight Arrow Connector 162"/>
+          <p:cNvCxnSpPr/>
+          <p:nvPr/>
+        </p:nvCxnSpPr>
+        <p:spPr>
+          <a:xfrm>
+            <a:off x="1188213" y="1264930"/>
+            <a:ext cx="154853" cy="0"/>
+          </a:xfrm>
+          <a:prstGeom prst="straightConnector1">
+            <a:avLst/>
+          </a:prstGeom>
+          <a:ln w="12700">
+            <a:solidFill>
+              <a:schemeClr val="tx1"/>
+            </a:solidFill>
+            <a:tailEnd type="triangle"/>
+          </a:ln>
+        </p:spPr>
+        <p:style>
+          <a:lnRef idx="1">
+            <a:schemeClr val="accent1"/>
+          </a:lnRef>
+          <a:fillRef idx="0">
+            <a:schemeClr val="accent1"/>
+          </a:fillRef>
+          <a:effectRef idx="0">
+            <a:schemeClr val="accent1"/>
+          </a:effectRef>
+          <a:fontRef idx="minor">
+            <a:schemeClr val="tx1"/>
+          </a:fontRef>
+        </p:style>
+      </p:cxnSp>
+      <p:cxnSp>
+        <p:nvCxnSpPr>
+          <p:cNvPr id="120" name="Straight Connector 119"/>
+          <p:cNvCxnSpPr/>
+          <p:nvPr/>
+        </p:nvCxnSpPr>
+        <p:spPr>
+          <a:xfrm>
+            <a:off x="3811169" y="922890"/>
+            <a:ext cx="1097280" cy="0"/>
+          </a:xfrm>
+          <a:prstGeom prst="line">
+            <a:avLst/>
+          </a:prstGeom>
+          <a:ln w="19050">
+            <a:solidFill>
+              <a:schemeClr val="tx1"/>
+            </a:solidFill>
+          </a:ln>
+        </p:spPr>
+        <p:style>
+          <a:lnRef idx="1">
+            <a:schemeClr val="accent1"/>
+          </a:lnRef>
+          <a:fillRef idx="0">
+            <a:schemeClr val="accent1"/>
+          </a:fillRef>
+          <a:effectRef idx="0">
+            <a:schemeClr val="accent1"/>
+          </a:effectRef>
+          <a:fontRef idx="minor">
+            <a:schemeClr val="tx1"/>
+          </a:fontRef>
+        </p:style>
+      </p:cxnSp>
+      <p:cxnSp>
+        <p:nvCxnSpPr>
+          <p:cNvPr id="121" name="Straight Connector 120"/>
+          <p:cNvCxnSpPr/>
+          <p:nvPr/>
+        </p:nvCxnSpPr>
+        <p:spPr>
+          <a:xfrm>
+            <a:off x="3811169" y="1610591"/>
+            <a:ext cx="1097280" cy="0"/>
+          </a:xfrm>
+          <a:prstGeom prst="line">
+            <a:avLst/>
+          </a:prstGeom>
+          <a:ln w="19050">
+            <a:solidFill>
+              <a:schemeClr val="tx1"/>
+            </a:solidFill>
+          </a:ln>
+        </p:spPr>
+        <p:style>
+          <a:lnRef idx="1">
+            <a:schemeClr val="accent1"/>
+          </a:lnRef>
+          <a:fillRef idx="0">
+            <a:schemeClr val="accent1"/>
+          </a:fillRef>
+          <a:effectRef idx="0">
+            <a:schemeClr val="accent1"/>
+          </a:effectRef>
+          <a:fontRef idx="minor">
+            <a:schemeClr val="tx1"/>
+          </a:fontRef>
+        </p:style>
+      </p:cxnSp>
+      <p:cxnSp>
+        <p:nvCxnSpPr>
+          <p:cNvPr id="122" name="Straight Connector 121"/>
+          <p:cNvCxnSpPr/>
+          <p:nvPr/>
+        </p:nvCxnSpPr>
+        <p:spPr>
+          <a:xfrm>
+            <a:off x="4020855" y="653011"/>
+            <a:ext cx="0" cy="1244104"/>
+          </a:xfrm>
+          <a:prstGeom prst="line">
+            <a:avLst/>
+          </a:prstGeom>
+          <a:ln w="19050">
+            <a:solidFill>
+              <a:schemeClr val="tx1"/>
+            </a:solidFill>
+          </a:ln>
+        </p:spPr>
+        <p:style>
+          <a:lnRef idx="1">
+            <a:schemeClr val="accent1"/>
+          </a:lnRef>
+          <a:fillRef idx="0">
+            <a:schemeClr val="accent1"/>
+          </a:fillRef>
+          <a:effectRef idx="0">
+            <a:schemeClr val="accent1"/>
+          </a:effectRef>
+          <a:fontRef idx="minor">
+            <a:schemeClr val="tx1"/>
+          </a:fontRef>
+        </p:style>
+      </p:cxnSp>
+      <p:cxnSp>
+        <p:nvCxnSpPr>
+          <p:cNvPr id="123" name="Straight Connector 122"/>
+          <p:cNvCxnSpPr/>
+          <p:nvPr/>
+        </p:nvCxnSpPr>
+        <p:spPr>
+          <a:xfrm>
+            <a:off x="4708556" y="653011"/>
+            <a:ext cx="0" cy="1244104"/>
+          </a:xfrm>
+          <a:prstGeom prst="line">
+            <a:avLst/>
+          </a:prstGeom>
+          <a:ln w="19050">
+            <a:solidFill>
+              <a:schemeClr val="tx1"/>
+            </a:solidFill>
+          </a:ln>
+        </p:spPr>
+        <p:style>
+          <a:lnRef idx="1">
+            <a:schemeClr val="accent1"/>
+          </a:lnRef>
+          <a:fillRef idx="0">
+            <a:schemeClr val="accent1"/>
+          </a:fillRef>
+          <a:effectRef idx="0">
+            <a:schemeClr val="accent1"/>
+          </a:effectRef>
+          <a:fontRef idx="minor">
+            <a:schemeClr val="tx1"/>
+          </a:fontRef>
+        </p:style>
+      </p:cxnSp>
+      <p:grpSp>
+        <p:nvGrpSpPr>
+          <p:cNvPr id="124" name="Group 123"/>
+          <p:cNvGrpSpPr/>
+          <p:nvPr/>
+        </p:nvGrpSpPr>
+        <p:grpSpPr>
+          <a:xfrm>
+            <a:off x="5118135" y="727211"/>
+            <a:ext cx="1433399" cy="1169904"/>
+            <a:chOff x="2378593" y="226634"/>
+            <a:chExt cx="1137275" cy="928215"/>
+          </a:xfrm>
+        </p:grpSpPr>
         <p:sp>
           <p:nvSpPr>
-            <p:cNvPr id="114" name="Oval 113"/>
+            <p:cNvPr id="125" name="Hexagon 124"/>
             <p:cNvSpPr/>
             <p:nvPr/>
           </p:nvSpPr>
           <p:spPr>
             <a:xfrm>
-              <a:off x="2550276" y="1256507"/>
-              <a:ext cx="108066" cy="108066"/>
+              <a:off x="2586440" y="382147"/>
+              <a:ext cx="721581" cy="622052"/>
             </a:xfrm>
-            <a:prstGeom prst="ellipse">
+            <a:prstGeom prst="hexagon">
               <a:avLst/>
             </a:prstGeom>
-            <a:solidFill>
-              <a:schemeClr val="bg2"/>
-            </a:solidFill>
-            <a:ln>
+            <a:noFill/>
+            <a:ln w="19050">
               <a:solidFill>
                 <a:schemeClr val="tx1"/>
               </a:solidFill>
@@ -3551,73 +3929,24 @@
             </a:p>
           </p:txBody>
         </p:sp>
-        <p:pic>
-          <p:nvPicPr>
-            <p:cNvPr id="76" name="Picture 75"/>
-            <p:cNvPicPr>
-              <a:picLocks noChangeAspect="1"/>
-            </p:cNvPicPr>
-            <p:nvPr/>
-          </p:nvPicPr>
-          <p:blipFill>
-            <a:blip r:embed="rId2"/>
-            <a:stretch>
-              <a:fillRect/>
-            </a:stretch>
-          </p:blipFill>
-          <p:spPr>
-            <a:xfrm>
-              <a:off x="892881" y="1416332"/>
-              <a:ext cx="482600" cy="139700"/>
-            </a:xfrm>
-            <a:prstGeom prst="rect">
-              <a:avLst/>
-            </a:prstGeom>
-          </p:spPr>
-        </p:pic>
-        <p:pic>
-          <p:nvPicPr>
-            <p:cNvPr id="119" name="Picture 118"/>
-            <p:cNvPicPr>
-              <a:picLocks noChangeAspect="1"/>
-            </p:cNvPicPr>
-            <p:nvPr/>
-          </p:nvPicPr>
-          <p:blipFill>
-            <a:blip r:embed="rId2"/>
-            <a:stretch>
-              <a:fillRect/>
-            </a:stretch>
-          </p:blipFill>
-          <p:spPr>
-            <a:xfrm>
-              <a:off x="2370466" y="1416332"/>
-              <a:ext cx="482600" cy="139700"/>
-            </a:xfrm>
-            <a:prstGeom prst="rect">
-              <a:avLst/>
-            </a:prstGeom>
-          </p:spPr>
-        </p:pic>
         <p:cxnSp>
           <p:nvCxnSpPr>
-            <p:cNvPr id="160" name="Straight Arrow Connector 159"/>
+            <p:cNvPr id="126" name="Straight Connector 125"/>
             <p:cNvCxnSpPr/>
             <p:nvPr/>
           </p:nvCxnSpPr>
           <p:spPr>
             <a:xfrm flipH="1" flipV="1">
-              <a:off x="2604151" y="1097989"/>
-              <a:ext cx="0" cy="155448"/>
+              <a:off x="2665660" y="226634"/>
+              <a:ext cx="76293" cy="155513"/>
             </a:xfrm>
-            <a:prstGeom prst="straightConnector1">
+            <a:prstGeom prst="line">
               <a:avLst/>
             </a:prstGeom>
-            <a:ln w="12700">
+            <a:ln w="19050">
               <a:solidFill>
                 <a:schemeClr val="tx1"/>
               </a:solidFill>
-              <a:tailEnd type="triangle"/>
             </a:ln>
           </p:spPr>
           <p:style>
@@ -3637,23 +3966,22 @@
         </p:cxnSp>
         <p:cxnSp>
           <p:nvCxnSpPr>
-            <p:cNvPr id="161" name="Straight Arrow Connector 160"/>
+            <p:cNvPr id="127" name="Straight Connector 126"/>
             <p:cNvCxnSpPr/>
             <p:nvPr/>
           </p:nvCxnSpPr>
           <p:spPr>
-            <a:xfrm>
-              <a:off x="2658342" y="1310540"/>
-              <a:ext cx="154853" cy="0"/>
+            <a:xfrm flipV="1">
+              <a:off x="3149575" y="226634"/>
+              <a:ext cx="77756" cy="155514"/>
             </a:xfrm>
-            <a:prstGeom prst="straightConnector1">
+            <a:prstGeom prst="line">
               <a:avLst/>
             </a:prstGeom>
-            <a:ln w="12700">
+            <a:ln w="19050">
               <a:solidFill>
                 <a:schemeClr val="tx1"/>
               </a:solidFill>
-              <a:tailEnd type="triangle"/>
             </a:ln>
           </p:spPr>
           <p:style>
@@ -3673,23 +4001,22 @@
         </p:cxnSp>
         <p:cxnSp>
           <p:nvCxnSpPr>
-            <p:cNvPr id="162" name="Straight Arrow Connector 161"/>
+            <p:cNvPr id="128" name="Straight Connector 127"/>
             <p:cNvCxnSpPr/>
             <p:nvPr/>
           </p:nvCxnSpPr>
           <p:spPr>
-            <a:xfrm flipH="1" flipV="1">
-              <a:off x="1134022" y="1052379"/>
-              <a:ext cx="0" cy="155448"/>
+            <a:xfrm>
+              <a:off x="3308021" y="693173"/>
+              <a:ext cx="207847" cy="0"/>
             </a:xfrm>
-            <a:prstGeom prst="straightConnector1">
+            <a:prstGeom prst="line">
               <a:avLst/>
             </a:prstGeom>
-            <a:ln w="12700">
+            <a:ln w="19050">
               <a:solidFill>
                 <a:schemeClr val="tx1"/>
               </a:solidFill>
-              <a:tailEnd type="triangle"/>
             </a:ln>
           </p:spPr>
           <p:style>
@@ -3709,70 +4036,19 @@
         </p:cxnSp>
         <p:cxnSp>
           <p:nvCxnSpPr>
-            <p:cNvPr id="163" name="Straight Arrow Connector 162"/>
+            <p:cNvPr id="129" name="Straight Connector 128"/>
             <p:cNvCxnSpPr/>
             <p:nvPr/>
           </p:nvCxnSpPr>
           <p:spPr>
             <a:xfrm>
-              <a:off x="1188213" y="1264930"/>
-              <a:ext cx="154853" cy="0"/>
-            </a:xfrm>
-            <a:prstGeom prst="straightConnector1">
-              <a:avLst/>
-            </a:prstGeom>
-            <a:ln w="12700">
-              <a:solidFill>
-                <a:schemeClr val="tx1"/>
-              </a:solidFill>
-              <a:tailEnd type="triangle"/>
-            </a:ln>
-          </p:spPr>
-          <p:style>
-            <a:lnRef idx="1">
-              <a:schemeClr val="accent1"/>
-            </a:lnRef>
-            <a:fillRef idx="0">
-              <a:schemeClr val="accent1"/>
-            </a:fillRef>
-            <a:effectRef idx="0">
-              <a:schemeClr val="accent1"/>
-            </a:effectRef>
-            <a:fontRef idx="minor">
-              <a:schemeClr val="tx1"/>
-            </a:fontRef>
-          </p:style>
-        </p:cxnSp>
-      </p:grpSp>
-      <p:grpSp>
-        <p:nvGrpSpPr>
-          <p:cNvPr id="93" name="Group 92"/>
-          <p:cNvGrpSpPr/>
-          <p:nvPr/>
-        </p:nvGrpSpPr>
-        <p:grpSpPr>
-          <a:xfrm>
-            <a:off x="3679412" y="199505"/>
-            <a:ext cx="2872122" cy="1698003"/>
-            <a:chOff x="3679412" y="199505"/>
-            <a:chExt cx="2872122" cy="1698003"/>
-          </a:xfrm>
-        </p:grpSpPr>
-        <p:cxnSp>
-          <p:nvCxnSpPr>
-            <p:cNvPr id="120" name="Straight Connector 119"/>
-            <p:cNvCxnSpPr/>
-            <p:nvPr/>
-          </p:nvCxnSpPr>
-          <p:spPr>
-            <a:xfrm>
-              <a:off x="3811169" y="922890"/>
-              <a:ext cx="1097280" cy="0"/>
+              <a:off x="3152508" y="1004199"/>
+              <a:ext cx="75324" cy="150650"/>
             </a:xfrm>
             <a:prstGeom prst="line">
               <a:avLst/>
             </a:prstGeom>
-            <a:ln>
+            <a:ln w="19050">
               <a:solidFill>
                 <a:schemeClr val="tx1"/>
               </a:solidFill>
@@ -3795,19 +4071,19 @@
         </p:cxnSp>
         <p:cxnSp>
           <p:nvCxnSpPr>
-            <p:cNvPr id="121" name="Straight Connector 120"/>
+            <p:cNvPr id="130" name="Straight Connector 129"/>
             <p:cNvCxnSpPr/>
             <p:nvPr/>
           </p:nvCxnSpPr>
           <p:spPr>
-            <a:xfrm>
-              <a:off x="3811169" y="1610591"/>
-              <a:ext cx="1097280" cy="0"/>
+            <a:xfrm flipH="1">
+              <a:off x="2671556" y="1004199"/>
+              <a:ext cx="70397" cy="150650"/>
             </a:xfrm>
             <a:prstGeom prst="line">
               <a:avLst/>
             </a:prstGeom>
-            <a:ln>
+            <a:ln w="19050">
               <a:solidFill>
                 <a:schemeClr val="tx1"/>
               </a:solidFill>
@@ -3830,19 +4106,19 @@
         </p:cxnSp>
         <p:cxnSp>
           <p:nvCxnSpPr>
-            <p:cNvPr id="122" name="Straight Connector 121"/>
+            <p:cNvPr id="131" name="Straight Connector 130"/>
             <p:cNvCxnSpPr/>
             <p:nvPr/>
           </p:nvCxnSpPr>
           <p:spPr>
-            <a:xfrm>
-              <a:off x="4020855" y="653011"/>
-              <a:ext cx="0" cy="1244104"/>
+            <a:xfrm flipH="1">
+              <a:off x="2378593" y="693173"/>
+              <a:ext cx="207847" cy="0"/>
             </a:xfrm>
             <a:prstGeom prst="line">
               <a:avLst/>
             </a:prstGeom>
-            <a:ln>
+            <a:ln w="19050">
               <a:solidFill>
                 <a:schemeClr val="tx1"/>
               </a:solidFill>
@@ -3863,455 +4139,816 @@
             </a:fontRef>
           </p:style>
         </p:cxnSp>
-        <p:cxnSp>
-          <p:nvCxnSpPr>
-            <p:cNvPr id="123" name="Straight Connector 122"/>
-            <p:cNvCxnSpPr/>
-            <p:nvPr/>
-          </p:nvCxnSpPr>
-          <p:spPr>
-            <a:xfrm>
-              <a:off x="4708556" y="653011"/>
-              <a:ext cx="0" cy="1244104"/>
-            </a:xfrm>
-            <a:prstGeom prst="line">
-              <a:avLst/>
-            </a:prstGeom>
-            <a:ln>
-              <a:solidFill>
-                <a:schemeClr val="tx1"/>
-              </a:solidFill>
-            </a:ln>
-          </p:spPr>
-          <p:style>
-            <a:lnRef idx="1">
-              <a:schemeClr val="accent1"/>
-            </a:lnRef>
-            <a:fillRef idx="0">
-              <a:schemeClr val="accent1"/>
-            </a:fillRef>
-            <a:effectRef idx="0">
-              <a:schemeClr val="accent1"/>
-            </a:effectRef>
-            <a:fontRef idx="minor">
-              <a:schemeClr val="tx1"/>
-            </a:fontRef>
-          </p:style>
-        </p:cxnSp>
-        <p:grpSp>
-          <p:nvGrpSpPr>
-            <p:cNvPr id="124" name="Group 123"/>
-            <p:cNvGrpSpPr/>
-            <p:nvPr/>
-          </p:nvGrpSpPr>
-          <p:grpSpPr>
-            <a:xfrm>
-              <a:off x="5118135" y="727211"/>
-              <a:ext cx="1433399" cy="1169904"/>
-              <a:chOff x="2378593" y="226634"/>
-              <a:chExt cx="1137275" cy="928215"/>
-            </a:xfrm>
-          </p:grpSpPr>
-          <p:sp>
-            <p:nvSpPr>
-              <p:cNvPr id="125" name="Hexagon 124"/>
-              <p:cNvSpPr/>
-              <p:nvPr/>
-            </p:nvSpPr>
-            <p:spPr>
-              <a:xfrm>
-                <a:off x="2586440" y="382147"/>
-                <a:ext cx="721581" cy="622052"/>
-              </a:xfrm>
-              <a:prstGeom prst="hexagon">
-                <a:avLst/>
-              </a:prstGeom>
-              <a:noFill/>
-              <a:ln w="6350">
-                <a:solidFill>
-                  <a:schemeClr val="tx1"/>
-                </a:solidFill>
-              </a:ln>
-            </p:spPr>
-            <p:style>
-              <a:lnRef idx="2">
-                <a:schemeClr val="accent1">
-                  <a:shade val="50000"/>
-                </a:schemeClr>
-              </a:lnRef>
-              <a:fillRef idx="1">
-                <a:schemeClr val="accent1"/>
-              </a:fillRef>
-              <a:effectRef idx="0">
-                <a:schemeClr val="accent1"/>
-              </a:effectRef>
-              <a:fontRef idx="minor">
-                <a:schemeClr val="lt1"/>
-              </a:fontRef>
-            </p:style>
-            <p:txBody>
-              <a:bodyPr rtlCol="0" anchor="ctr"/>
-              <a:lstStyle/>
-              <a:p>
-                <a:pPr algn="ctr"/>
-                <a:endParaRPr lang="en-US"/>
-              </a:p>
-            </p:txBody>
-          </p:sp>
-          <p:cxnSp>
-            <p:nvCxnSpPr>
-              <p:cNvPr id="126" name="Straight Connector 125"/>
-              <p:cNvCxnSpPr/>
-              <p:nvPr/>
-            </p:nvCxnSpPr>
-            <p:spPr>
-              <a:xfrm flipH="1" flipV="1">
-                <a:off x="2665660" y="226634"/>
-                <a:ext cx="76293" cy="155513"/>
-              </a:xfrm>
-              <a:prstGeom prst="line">
-                <a:avLst/>
-              </a:prstGeom>
-              <a:ln w="6350">
-                <a:solidFill>
-                  <a:schemeClr val="tx1"/>
-                </a:solidFill>
-              </a:ln>
-            </p:spPr>
-            <p:style>
-              <a:lnRef idx="1">
-                <a:schemeClr val="accent1"/>
-              </a:lnRef>
-              <a:fillRef idx="0">
-                <a:schemeClr val="accent1"/>
-              </a:fillRef>
-              <a:effectRef idx="0">
-                <a:schemeClr val="accent1"/>
-              </a:effectRef>
-              <a:fontRef idx="minor">
-                <a:schemeClr val="tx1"/>
-              </a:fontRef>
-            </p:style>
-          </p:cxnSp>
-          <p:cxnSp>
-            <p:nvCxnSpPr>
-              <p:cNvPr id="127" name="Straight Connector 126"/>
-              <p:cNvCxnSpPr/>
-              <p:nvPr/>
-            </p:nvCxnSpPr>
-            <p:spPr>
-              <a:xfrm flipV="1">
-                <a:off x="3149575" y="226634"/>
-                <a:ext cx="77756" cy="155514"/>
-              </a:xfrm>
-              <a:prstGeom prst="line">
-                <a:avLst/>
-              </a:prstGeom>
-              <a:ln w="6350">
-                <a:solidFill>
-                  <a:schemeClr val="tx1"/>
-                </a:solidFill>
-              </a:ln>
-            </p:spPr>
-            <p:style>
-              <a:lnRef idx="1">
-                <a:schemeClr val="accent1"/>
-              </a:lnRef>
-              <a:fillRef idx="0">
-                <a:schemeClr val="accent1"/>
-              </a:fillRef>
-              <a:effectRef idx="0">
-                <a:schemeClr val="accent1"/>
-              </a:effectRef>
-              <a:fontRef idx="minor">
-                <a:schemeClr val="tx1"/>
-              </a:fontRef>
-            </p:style>
-          </p:cxnSp>
-          <p:cxnSp>
-            <p:nvCxnSpPr>
-              <p:cNvPr id="128" name="Straight Connector 127"/>
-              <p:cNvCxnSpPr/>
-              <p:nvPr/>
-            </p:nvCxnSpPr>
-            <p:spPr>
-              <a:xfrm>
-                <a:off x="3308021" y="693173"/>
-                <a:ext cx="207847" cy="0"/>
-              </a:xfrm>
-              <a:prstGeom prst="line">
-                <a:avLst/>
-              </a:prstGeom>
-              <a:ln w="6350">
-                <a:solidFill>
-                  <a:schemeClr val="tx1"/>
-                </a:solidFill>
-              </a:ln>
-            </p:spPr>
-            <p:style>
-              <a:lnRef idx="1">
-                <a:schemeClr val="accent1"/>
-              </a:lnRef>
-              <a:fillRef idx="0">
-                <a:schemeClr val="accent1"/>
-              </a:fillRef>
-              <a:effectRef idx="0">
-                <a:schemeClr val="accent1"/>
-              </a:effectRef>
-              <a:fontRef idx="minor">
-                <a:schemeClr val="tx1"/>
-              </a:fontRef>
-            </p:style>
-          </p:cxnSp>
-          <p:cxnSp>
-            <p:nvCxnSpPr>
-              <p:cNvPr id="129" name="Straight Connector 128"/>
-              <p:cNvCxnSpPr/>
-              <p:nvPr/>
-            </p:nvCxnSpPr>
-            <p:spPr>
-              <a:xfrm>
-                <a:off x="3152508" y="1004199"/>
-                <a:ext cx="75324" cy="150650"/>
-              </a:xfrm>
-              <a:prstGeom prst="line">
-                <a:avLst/>
-              </a:prstGeom>
-              <a:ln w="6350">
-                <a:solidFill>
-                  <a:schemeClr val="tx1"/>
-                </a:solidFill>
-              </a:ln>
-            </p:spPr>
-            <p:style>
-              <a:lnRef idx="1">
-                <a:schemeClr val="accent1"/>
-              </a:lnRef>
-              <a:fillRef idx="0">
-                <a:schemeClr val="accent1"/>
-              </a:fillRef>
-              <a:effectRef idx="0">
-                <a:schemeClr val="accent1"/>
-              </a:effectRef>
-              <a:fontRef idx="minor">
-                <a:schemeClr val="tx1"/>
-              </a:fontRef>
-            </p:style>
-          </p:cxnSp>
-          <p:cxnSp>
-            <p:nvCxnSpPr>
-              <p:cNvPr id="130" name="Straight Connector 129"/>
-              <p:cNvCxnSpPr/>
-              <p:nvPr/>
-            </p:nvCxnSpPr>
-            <p:spPr>
-              <a:xfrm flipH="1">
-                <a:off x="2671556" y="1004199"/>
-                <a:ext cx="70397" cy="150650"/>
-              </a:xfrm>
-              <a:prstGeom prst="line">
-                <a:avLst/>
-              </a:prstGeom>
-              <a:ln w="6350">
-                <a:solidFill>
-                  <a:schemeClr val="tx1"/>
-                </a:solidFill>
-              </a:ln>
-            </p:spPr>
-            <p:style>
-              <a:lnRef idx="1">
-                <a:schemeClr val="accent1"/>
-              </a:lnRef>
-              <a:fillRef idx="0">
-                <a:schemeClr val="accent1"/>
-              </a:fillRef>
-              <a:effectRef idx="0">
-                <a:schemeClr val="accent1"/>
-              </a:effectRef>
-              <a:fontRef idx="minor">
-                <a:schemeClr val="tx1"/>
-              </a:fontRef>
-            </p:style>
-          </p:cxnSp>
-          <p:cxnSp>
-            <p:nvCxnSpPr>
-              <p:cNvPr id="131" name="Straight Connector 130"/>
-              <p:cNvCxnSpPr/>
-              <p:nvPr/>
-            </p:nvCxnSpPr>
-            <p:spPr>
-              <a:xfrm flipH="1">
-                <a:off x="2378593" y="693173"/>
-                <a:ext cx="207847" cy="0"/>
-              </a:xfrm>
-              <a:prstGeom prst="line">
-                <a:avLst/>
-              </a:prstGeom>
-              <a:ln w="6350">
-                <a:solidFill>
-                  <a:schemeClr val="tx1"/>
-                </a:solidFill>
-              </a:ln>
-            </p:spPr>
-            <p:style>
-              <a:lnRef idx="1">
-                <a:schemeClr val="accent1"/>
-              </a:lnRef>
-              <a:fillRef idx="0">
-                <a:schemeClr val="accent1"/>
-              </a:fillRef>
-              <a:effectRef idx="0">
-                <a:schemeClr val="accent1"/>
-              </a:effectRef>
-              <a:fontRef idx="minor">
-                <a:schemeClr val="tx1"/>
-              </a:fontRef>
-            </p:style>
-          </p:cxnSp>
-        </p:grpSp>
-        <p:sp>
-          <p:nvSpPr>
-            <p:cNvPr id="132" name="TextBox 131"/>
-            <p:cNvSpPr txBox="1"/>
-            <p:nvPr/>
-          </p:nvSpPr>
-          <p:spPr>
-            <a:xfrm>
-              <a:off x="3679412" y="199505"/>
-              <a:ext cx="1896695" cy="307777"/>
-            </a:xfrm>
-            <a:prstGeom prst="rect">
-              <a:avLst/>
-            </a:prstGeom>
-            <a:noFill/>
-          </p:spPr>
-          <p:txBody>
-            <a:bodyPr wrap="square" rtlCol="0">
-              <a:spAutoFit/>
-            </a:bodyPr>
-            <a:lstStyle/>
-            <a:p>
-              <a:r>
-                <a:rPr lang="en-US" sz="1400" dirty="0" smtClean="0">
-                  <a:latin typeface="Times" charset="0"/>
-                  <a:ea typeface="Times" charset="0"/>
-                  <a:cs typeface="Times" charset="0"/>
-                </a:rPr>
-                <a:t>(c) C-grid Staggering</a:t>
-              </a:r>
-              <a:endParaRPr lang="en-US" sz="1400" dirty="0">
+      </p:grpSp>
+      <p:sp>
+        <p:nvSpPr>
+          <p:cNvPr id="132" name="TextBox 131"/>
+          <p:cNvSpPr txBox="1"/>
+          <p:nvPr/>
+        </p:nvSpPr>
+        <p:spPr>
+          <a:xfrm>
+            <a:off x="3679412" y="199505"/>
+            <a:ext cx="1896695" cy="307777"/>
+          </a:xfrm>
+          <a:prstGeom prst="rect">
+            <a:avLst/>
+          </a:prstGeom>
+          <a:noFill/>
+        </p:spPr>
+        <p:txBody>
+          <a:bodyPr wrap="square" rtlCol="0">
+            <a:spAutoFit/>
+          </a:bodyPr>
+          <a:lstStyle/>
+          <a:p>
+            <a:r>
+              <a:rPr lang="en-US" sz="1400" dirty="0" smtClean="0">
                 <a:latin typeface="Times" charset="0"/>
                 <a:ea typeface="Times" charset="0"/>
                 <a:cs typeface="Times" charset="0"/>
-              </a:endParaRPr>
-            </a:p>
-          </p:txBody>
-        </p:sp>
+              </a:rPr>
+              <a:t>(c) C-grid Staggering</a:t>
+            </a:r>
+            <a:endParaRPr lang="en-US" sz="1400" dirty="0">
+              <a:latin typeface="Times" charset="0"/>
+              <a:ea typeface="Times" charset="0"/>
+              <a:cs typeface="Times" charset="0"/>
+            </a:endParaRPr>
+          </a:p>
+        </p:txBody>
+      </p:sp>
+      <p:sp>
+        <p:nvSpPr>
+          <p:cNvPr id="133" name="Oval 132"/>
+          <p:cNvSpPr/>
+          <p:nvPr/>
+        </p:nvSpPr>
+        <p:spPr>
+          <a:xfrm>
+            <a:off x="4310672" y="1212707"/>
+            <a:ext cx="108066" cy="108066"/>
+          </a:xfrm>
+          <a:prstGeom prst="ellipse">
+            <a:avLst/>
+          </a:prstGeom>
+          <a:solidFill>
+            <a:schemeClr val="bg2"/>
+          </a:solidFill>
+          <a:ln>
+            <a:solidFill>
+              <a:schemeClr val="tx1"/>
+            </a:solidFill>
+          </a:ln>
+        </p:spPr>
+        <p:style>
+          <a:lnRef idx="2">
+            <a:schemeClr val="accent1">
+              <a:shade val="50000"/>
+            </a:schemeClr>
+          </a:lnRef>
+          <a:fillRef idx="1">
+            <a:schemeClr val="accent1"/>
+          </a:fillRef>
+          <a:effectRef idx="0">
+            <a:schemeClr val="accent1"/>
+          </a:effectRef>
+          <a:fontRef idx="minor">
+            <a:schemeClr val="lt1"/>
+          </a:fontRef>
+        </p:style>
+        <p:txBody>
+          <a:bodyPr rtlCol="0" anchor="ctr"/>
+          <a:lstStyle/>
+          <a:p>
+            <a:pPr algn="ctr"/>
+            <a:endParaRPr lang="en-US"/>
+          </a:p>
+        </p:txBody>
+      </p:sp>
+      <p:sp>
+        <p:nvSpPr>
+          <p:cNvPr id="134" name="Oval 133"/>
+          <p:cNvSpPr/>
+          <p:nvPr/>
+        </p:nvSpPr>
+        <p:spPr>
+          <a:xfrm>
+            <a:off x="5780801" y="1256507"/>
+            <a:ext cx="108066" cy="108066"/>
+          </a:xfrm>
+          <a:prstGeom prst="ellipse">
+            <a:avLst/>
+          </a:prstGeom>
+          <a:solidFill>
+            <a:schemeClr val="bg2"/>
+          </a:solidFill>
+          <a:ln>
+            <a:solidFill>
+              <a:schemeClr val="tx1"/>
+            </a:solidFill>
+          </a:ln>
+        </p:spPr>
+        <p:style>
+          <a:lnRef idx="2">
+            <a:schemeClr val="accent1">
+              <a:shade val="50000"/>
+            </a:schemeClr>
+          </a:lnRef>
+          <a:fillRef idx="1">
+            <a:schemeClr val="accent1"/>
+          </a:fillRef>
+          <a:effectRef idx="0">
+            <a:schemeClr val="accent1"/>
+          </a:effectRef>
+          <a:fontRef idx="minor">
+            <a:schemeClr val="lt1"/>
+          </a:fontRef>
+        </p:style>
+        <p:txBody>
+          <a:bodyPr rtlCol="0" anchor="ctr"/>
+          <a:lstStyle/>
+          <a:p>
+            <a:pPr algn="ctr"/>
+            <a:endParaRPr lang="en-US"/>
+          </a:p>
+        </p:txBody>
+      </p:sp>
+      <p:sp>
+        <p:nvSpPr>
+          <p:cNvPr id="137" name="Oval 136"/>
+          <p:cNvSpPr/>
+          <p:nvPr/>
+        </p:nvSpPr>
+        <p:spPr>
+          <a:xfrm>
+            <a:off x="4327841" y="886313"/>
+            <a:ext cx="73152" cy="73152"/>
+          </a:xfrm>
+          <a:prstGeom prst="ellipse">
+            <a:avLst/>
+          </a:prstGeom>
+          <a:solidFill>
+            <a:schemeClr val="bg2"/>
+          </a:solidFill>
+          <a:ln>
+            <a:solidFill>
+              <a:schemeClr val="tx1"/>
+            </a:solidFill>
+          </a:ln>
+        </p:spPr>
+        <p:style>
+          <a:lnRef idx="2">
+            <a:schemeClr val="accent1">
+              <a:shade val="50000"/>
+            </a:schemeClr>
+          </a:lnRef>
+          <a:fillRef idx="1">
+            <a:schemeClr val="accent1"/>
+          </a:fillRef>
+          <a:effectRef idx="0">
+            <a:schemeClr val="accent1"/>
+          </a:effectRef>
+          <a:fontRef idx="minor">
+            <a:schemeClr val="lt1"/>
+          </a:fontRef>
+        </p:style>
+        <p:txBody>
+          <a:bodyPr rtlCol="0" anchor="ctr"/>
+          <a:lstStyle/>
+          <a:p>
+            <a:pPr algn="ctr"/>
+            <a:endParaRPr lang="en-US"/>
+          </a:p>
+        </p:txBody>
+      </p:sp>
+      <p:sp>
+        <p:nvSpPr>
+          <p:cNvPr id="138" name="Oval 137"/>
+          <p:cNvSpPr/>
+          <p:nvPr/>
+        </p:nvSpPr>
+        <p:spPr>
+          <a:xfrm>
+            <a:off x="4671978" y="1228354"/>
+            <a:ext cx="73152" cy="73152"/>
+          </a:xfrm>
+          <a:prstGeom prst="ellipse">
+            <a:avLst/>
+          </a:prstGeom>
+          <a:solidFill>
+            <a:schemeClr val="bg2"/>
+          </a:solidFill>
+          <a:ln>
+            <a:solidFill>
+              <a:schemeClr val="tx1"/>
+            </a:solidFill>
+          </a:ln>
+        </p:spPr>
+        <p:style>
+          <a:lnRef idx="2">
+            <a:schemeClr val="accent1">
+              <a:shade val="50000"/>
+            </a:schemeClr>
+          </a:lnRef>
+          <a:fillRef idx="1">
+            <a:schemeClr val="accent1"/>
+          </a:fillRef>
+          <a:effectRef idx="0">
+            <a:schemeClr val="accent1"/>
+          </a:effectRef>
+          <a:fontRef idx="minor">
+            <a:schemeClr val="lt1"/>
+          </a:fontRef>
+        </p:style>
+        <p:txBody>
+          <a:bodyPr rtlCol="0" anchor="ctr"/>
+          <a:lstStyle/>
+          <a:p>
+            <a:pPr algn="ctr"/>
+            <a:endParaRPr lang="en-US"/>
+          </a:p>
+        </p:txBody>
+      </p:sp>
+      <p:sp>
+        <p:nvSpPr>
+          <p:cNvPr id="139" name="Oval 138"/>
+          <p:cNvSpPr/>
+          <p:nvPr/>
+        </p:nvSpPr>
+        <p:spPr>
+          <a:xfrm>
+            <a:off x="3985584" y="1228354"/>
+            <a:ext cx="73152" cy="73152"/>
+          </a:xfrm>
+          <a:prstGeom prst="ellipse">
+            <a:avLst/>
+          </a:prstGeom>
+          <a:solidFill>
+            <a:schemeClr val="bg2"/>
+          </a:solidFill>
+          <a:ln>
+            <a:solidFill>
+              <a:schemeClr val="tx1"/>
+            </a:solidFill>
+          </a:ln>
+        </p:spPr>
+        <p:style>
+          <a:lnRef idx="2">
+            <a:schemeClr val="accent1">
+              <a:shade val="50000"/>
+            </a:schemeClr>
+          </a:lnRef>
+          <a:fillRef idx="1">
+            <a:schemeClr val="accent1"/>
+          </a:fillRef>
+          <a:effectRef idx="0">
+            <a:schemeClr val="accent1"/>
+          </a:effectRef>
+          <a:fontRef idx="minor">
+            <a:schemeClr val="lt1"/>
+          </a:fontRef>
+        </p:style>
+        <p:txBody>
+          <a:bodyPr rtlCol="0" anchor="ctr"/>
+          <a:lstStyle/>
+          <a:p>
+            <a:pPr algn="ctr"/>
+            <a:endParaRPr lang="en-US"/>
+          </a:p>
+        </p:txBody>
+      </p:sp>
+      <p:sp>
+        <p:nvSpPr>
+          <p:cNvPr id="140" name="Oval 139"/>
+          <p:cNvSpPr/>
+          <p:nvPr/>
+        </p:nvSpPr>
+        <p:spPr>
+          <a:xfrm>
+            <a:off x="4330174" y="1574013"/>
+            <a:ext cx="73152" cy="73152"/>
+          </a:xfrm>
+          <a:prstGeom prst="ellipse">
+            <a:avLst/>
+          </a:prstGeom>
+          <a:solidFill>
+            <a:schemeClr val="bg2"/>
+          </a:solidFill>
+          <a:ln>
+            <a:solidFill>
+              <a:schemeClr val="tx1"/>
+            </a:solidFill>
+          </a:ln>
+        </p:spPr>
+        <p:style>
+          <a:lnRef idx="2">
+            <a:schemeClr val="accent1">
+              <a:shade val="50000"/>
+            </a:schemeClr>
+          </a:lnRef>
+          <a:fillRef idx="1">
+            <a:schemeClr val="accent1"/>
+          </a:fillRef>
+          <a:effectRef idx="0">
+            <a:schemeClr val="accent1"/>
+          </a:effectRef>
+          <a:fontRef idx="minor">
+            <a:schemeClr val="lt1"/>
+          </a:fontRef>
+        </p:style>
+        <p:txBody>
+          <a:bodyPr rtlCol="0" anchor="ctr"/>
+          <a:lstStyle/>
+          <a:p>
+            <a:pPr algn="ctr"/>
+            <a:endParaRPr lang="en-US"/>
+          </a:p>
+        </p:txBody>
+      </p:sp>
+      <p:pic>
+        <p:nvPicPr>
+          <p:cNvPr id="79" name="Picture 78"/>
+          <p:cNvPicPr>
+            <a:picLocks noChangeAspect="1"/>
+          </p:cNvPicPr>
+          <p:nvPr/>
+        </p:nvPicPr>
+        <p:blipFill>
+          <a:blip r:embed="rId3"/>
+          <a:stretch>
+            <a:fillRect/>
+          </a:stretch>
+        </p:blipFill>
+        <p:spPr>
+          <a:xfrm>
+            <a:off x="4413224" y="1067801"/>
+            <a:ext cx="101600" cy="139700"/>
+          </a:xfrm>
+          <a:prstGeom prst="rect">
+            <a:avLst/>
+          </a:prstGeom>
+        </p:spPr>
+      </p:pic>
+      <p:pic>
+        <p:nvPicPr>
+          <p:cNvPr id="80" name="Picture 79"/>
+          <p:cNvPicPr>
+            <a:picLocks noChangeAspect="1"/>
+          </p:cNvPicPr>
+          <p:nvPr/>
+        </p:nvPicPr>
+        <p:blipFill>
+          <a:blip r:embed="rId4"/>
+          <a:stretch>
+            <a:fillRect/>
+          </a:stretch>
+        </p:blipFill>
+        <p:spPr>
+          <a:xfrm>
+            <a:off x="4788752" y="1095104"/>
+            <a:ext cx="114300" cy="101600"/>
+          </a:xfrm>
+          <a:prstGeom prst="rect">
+            <a:avLst/>
+          </a:prstGeom>
+        </p:spPr>
+      </p:pic>
+      <p:pic>
+        <p:nvPicPr>
+          <p:cNvPr id="145" name="Picture 144"/>
+          <p:cNvPicPr>
+            <a:picLocks noChangeAspect="1"/>
+          </p:cNvPicPr>
+          <p:nvPr/>
+        </p:nvPicPr>
+        <p:blipFill>
+          <a:blip r:embed="rId4"/>
+          <a:stretch>
+            <a:fillRect/>
+          </a:stretch>
+        </p:blipFill>
+        <p:spPr>
+          <a:xfrm>
+            <a:off x="3831116" y="1091170"/>
+            <a:ext cx="114300" cy="101600"/>
+          </a:xfrm>
+          <a:prstGeom prst="rect">
+            <a:avLst/>
+          </a:prstGeom>
+        </p:spPr>
+      </p:pic>
+      <p:pic>
+        <p:nvPicPr>
+          <p:cNvPr id="81" name="Picture 80"/>
+          <p:cNvPicPr>
+            <a:picLocks noChangeAspect="1"/>
+          </p:cNvPicPr>
+          <p:nvPr/>
+        </p:nvPicPr>
+        <p:blipFill>
+          <a:blip r:embed="rId5"/>
+          <a:stretch>
+            <a:fillRect/>
+          </a:stretch>
+        </p:blipFill>
+        <p:spPr>
+          <a:xfrm>
+            <a:off x="4428230" y="1696228"/>
+            <a:ext cx="88900" cy="101600"/>
+          </a:xfrm>
+          <a:prstGeom prst="rect">
+            <a:avLst/>
+          </a:prstGeom>
+        </p:spPr>
+      </p:pic>
+      <p:pic>
+        <p:nvPicPr>
+          <p:cNvPr id="147" name="Picture 146"/>
+          <p:cNvPicPr>
+            <a:picLocks noChangeAspect="1"/>
+          </p:cNvPicPr>
+          <p:nvPr/>
+        </p:nvPicPr>
+        <p:blipFill>
+          <a:blip r:embed="rId5"/>
+          <a:stretch>
+            <a:fillRect/>
+          </a:stretch>
+        </p:blipFill>
+        <p:spPr>
+          <a:xfrm>
+            <a:off x="4428230" y="760341"/>
+            <a:ext cx="88900" cy="101600"/>
+          </a:xfrm>
+          <a:prstGeom prst="rect">
+            <a:avLst/>
+          </a:prstGeom>
+        </p:spPr>
+      </p:pic>
+      <p:cxnSp>
+        <p:nvCxnSpPr>
+          <p:cNvPr id="83" name="Straight Arrow Connector 82"/>
+          <p:cNvCxnSpPr>
+            <a:stCxn id="140" idx="4"/>
+          </p:cNvCxnSpPr>
+          <p:nvPr/>
+        </p:nvCxnSpPr>
+        <p:spPr>
+          <a:xfrm>
+            <a:off x="4366750" y="1647165"/>
+            <a:ext cx="0" cy="155012"/>
+          </a:xfrm>
+          <a:prstGeom prst="straightConnector1">
+            <a:avLst/>
+          </a:prstGeom>
+          <a:ln w="12700">
+            <a:solidFill>
+              <a:schemeClr val="tx1"/>
+            </a:solidFill>
+            <a:tailEnd type="triangle"/>
+          </a:ln>
+        </p:spPr>
+        <p:style>
+          <a:lnRef idx="1">
+            <a:schemeClr val="accent1"/>
+          </a:lnRef>
+          <a:fillRef idx="0">
+            <a:schemeClr val="accent1"/>
+          </a:fillRef>
+          <a:effectRef idx="0">
+            <a:schemeClr val="accent1"/>
+          </a:effectRef>
+          <a:fontRef idx="minor">
+            <a:schemeClr val="tx1"/>
+          </a:fontRef>
+        </p:style>
+      </p:cxnSp>
+      <p:cxnSp>
+        <p:nvCxnSpPr>
+          <p:cNvPr id="152" name="Straight Arrow Connector 151"/>
+          <p:cNvCxnSpPr/>
+          <p:nvPr/>
+        </p:nvCxnSpPr>
+        <p:spPr>
+          <a:xfrm flipH="1" flipV="1">
+            <a:off x="4365113" y="736995"/>
+            <a:ext cx="0" cy="155448"/>
+          </a:xfrm>
+          <a:prstGeom prst="straightConnector1">
+            <a:avLst/>
+          </a:prstGeom>
+          <a:ln w="12700">
+            <a:solidFill>
+              <a:schemeClr val="tx1"/>
+            </a:solidFill>
+            <a:tailEnd type="triangle"/>
+          </a:ln>
+        </p:spPr>
+        <p:style>
+          <a:lnRef idx="1">
+            <a:schemeClr val="accent1"/>
+          </a:lnRef>
+          <a:fillRef idx="0">
+            <a:schemeClr val="accent1"/>
+          </a:fillRef>
+          <a:effectRef idx="0">
+            <a:schemeClr val="accent1"/>
+          </a:effectRef>
+          <a:fontRef idx="minor">
+            <a:schemeClr val="tx1"/>
+          </a:fontRef>
+        </p:style>
+      </p:cxnSp>
+      <p:cxnSp>
+        <p:nvCxnSpPr>
+          <p:cNvPr id="155" name="Straight Arrow Connector 154"/>
+          <p:cNvCxnSpPr>
+            <a:stCxn id="138" idx="6"/>
+          </p:cNvCxnSpPr>
+          <p:nvPr/>
+        </p:nvCxnSpPr>
+        <p:spPr>
+          <a:xfrm>
+            <a:off x="4745130" y="1264930"/>
+            <a:ext cx="154853" cy="0"/>
+          </a:xfrm>
+          <a:prstGeom prst="straightConnector1">
+            <a:avLst/>
+          </a:prstGeom>
+          <a:ln w="12700">
+            <a:solidFill>
+              <a:schemeClr val="tx1"/>
+            </a:solidFill>
+            <a:tailEnd type="triangle"/>
+          </a:ln>
+        </p:spPr>
+        <p:style>
+          <a:lnRef idx="1">
+            <a:schemeClr val="accent1"/>
+          </a:lnRef>
+          <a:fillRef idx="0">
+            <a:schemeClr val="accent1"/>
+          </a:fillRef>
+          <a:effectRef idx="0">
+            <a:schemeClr val="accent1"/>
+          </a:effectRef>
+          <a:fontRef idx="minor">
+            <a:schemeClr val="tx1"/>
+          </a:fontRef>
+        </p:style>
+      </p:cxnSp>
+      <p:cxnSp>
+        <p:nvCxnSpPr>
+          <p:cNvPr id="158" name="Straight Arrow Connector 157"/>
+          <p:cNvCxnSpPr/>
+          <p:nvPr/>
+        </p:nvCxnSpPr>
+        <p:spPr>
+          <a:xfrm flipH="1">
+            <a:off x="3829443" y="1265913"/>
+            <a:ext cx="156141" cy="0"/>
+          </a:xfrm>
+          <a:prstGeom prst="straightConnector1">
+            <a:avLst/>
+          </a:prstGeom>
+          <a:ln w="12700">
+            <a:solidFill>
+              <a:schemeClr val="tx1"/>
+            </a:solidFill>
+            <a:tailEnd type="triangle"/>
+          </a:ln>
+        </p:spPr>
+        <p:style>
+          <a:lnRef idx="1">
+            <a:schemeClr val="accent1"/>
+          </a:lnRef>
+          <a:fillRef idx="0">
+            <a:schemeClr val="accent1"/>
+          </a:fillRef>
+          <a:effectRef idx="0">
+            <a:schemeClr val="accent1"/>
+          </a:effectRef>
+          <a:fontRef idx="minor">
+            <a:schemeClr val="tx1"/>
+          </a:fontRef>
+        </p:style>
+      </p:cxnSp>
+      <p:sp>
+        <p:nvSpPr>
+          <p:cNvPr id="164" name="Oval 163"/>
+          <p:cNvSpPr/>
+          <p:nvPr/>
+        </p:nvSpPr>
+        <p:spPr>
+          <a:xfrm>
+            <a:off x="5796136" y="890435"/>
+            <a:ext cx="73152" cy="73152"/>
+          </a:xfrm>
+          <a:prstGeom prst="ellipse">
+            <a:avLst/>
+          </a:prstGeom>
+          <a:solidFill>
+            <a:schemeClr val="bg2"/>
+          </a:solidFill>
+          <a:ln>
+            <a:solidFill>
+              <a:schemeClr val="tx1"/>
+            </a:solidFill>
+          </a:ln>
+        </p:spPr>
+        <p:style>
+          <a:lnRef idx="2">
+            <a:schemeClr val="accent1">
+              <a:shade val="50000"/>
+            </a:schemeClr>
+          </a:lnRef>
+          <a:fillRef idx="1">
+            <a:schemeClr val="accent1"/>
+          </a:fillRef>
+          <a:effectRef idx="0">
+            <a:schemeClr val="accent1"/>
+          </a:effectRef>
+          <a:fontRef idx="minor">
+            <a:schemeClr val="lt1"/>
+          </a:fontRef>
+        </p:style>
+        <p:txBody>
+          <a:bodyPr rtlCol="0" anchor="ctr"/>
+          <a:lstStyle/>
+          <a:p>
+            <a:pPr algn="ctr"/>
+            <a:endParaRPr lang="en-US"/>
+          </a:p>
+        </p:txBody>
+      </p:sp>
+      <p:cxnSp>
+        <p:nvCxnSpPr>
+          <p:cNvPr id="165" name="Straight Arrow Connector 164"/>
+          <p:cNvCxnSpPr/>
+          <p:nvPr/>
+        </p:nvCxnSpPr>
+        <p:spPr>
+          <a:xfrm flipH="1" flipV="1">
+            <a:off x="5833408" y="741117"/>
+            <a:ext cx="0" cy="155448"/>
+          </a:xfrm>
+          <a:prstGeom prst="straightConnector1">
+            <a:avLst/>
+          </a:prstGeom>
+          <a:ln w="12700">
+            <a:solidFill>
+              <a:schemeClr val="tx1"/>
+            </a:solidFill>
+            <a:tailEnd type="triangle"/>
+          </a:ln>
+        </p:spPr>
+        <p:style>
+          <a:lnRef idx="1">
+            <a:schemeClr val="accent1"/>
+          </a:lnRef>
+          <a:fillRef idx="0">
+            <a:schemeClr val="accent1"/>
+          </a:fillRef>
+          <a:effectRef idx="0">
+            <a:schemeClr val="accent1"/>
+          </a:effectRef>
+          <a:fontRef idx="minor">
+            <a:schemeClr val="tx1"/>
+          </a:fontRef>
+        </p:style>
+      </p:cxnSp>
+      <p:sp>
+        <p:nvSpPr>
+          <p:cNvPr id="166" name="Oval 165"/>
+          <p:cNvSpPr/>
+          <p:nvPr/>
+        </p:nvSpPr>
+        <p:spPr>
+          <a:xfrm>
+            <a:off x="5796832" y="1669344"/>
+            <a:ext cx="73152" cy="73152"/>
+          </a:xfrm>
+          <a:prstGeom prst="ellipse">
+            <a:avLst/>
+          </a:prstGeom>
+          <a:solidFill>
+            <a:schemeClr val="bg2"/>
+          </a:solidFill>
+          <a:ln>
+            <a:solidFill>
+              <a:schemeClr val="tx1"/>
+            </a:solidFill>
+          </a:ln>
+        </p:spPr>
+        <p:style>
+          <a:lnRef idx="2">
+            <a:schemeClr val="accent1">
+              <a:shade val="50000"/>
+            </a:schemeClr>
+          </a:lnRef>
+          <a:fillRef idx="1">
+            <a:schemeClr val="accent1"/>
+          </a:fillRef>
+          <a:effectRef idx="0">
+            <a:schemeClr val="accent1"/>
+          </a:effectRef>
+          <a:fontRef idx="minor">
+            <a:schemeClr val="lt1"/>
+          </a:fontRef>
+        </p:style>
+        <p:txBody>
+          <a:bodyPr rtlCol="0" anchor="ctr"/>
+          <a:lstStyle/>
+          <a:p>
+            <a:pPr algn="ctr"/>
+            <a:endParaRPr lang="en-US"/>
+          </a:p>
+        </p:txBody>
+      </p:sp>
+      <p:cxnSp>
+        <p:nvCxnSpPr>
+          <p:cNvPr id="167" name="Straight Arrow Connector 166"/>
+          <p:cNvCxnSpPr/>
+          <p:nvPr/>
+        </p:nvCxnSpPr>
+        <p:spPr>
+          <a:xfrm>
+            <a:off x="5833408" y="1742496"/>
+            <a:ext cx="0" cy="155012"/>
+          </a:xfrm>
+          <a:prstGeom prst="straightConnector1">
+            <a:avLst/>
+          </a:prstGeom>
+          <a:ln w="12700">
+            <a:solidFill>
+              <a:schemeClr val="tx1"/>
+            </a:solidFill>
+            <a:tailEnd type="triangle"/>
+          </a:ln>
+        </p:spPr>
+        <p:style>
+          <a:lnRef idx="1">
+            <a:schemeClr val="accent1"/>
+          </a:lnRef>
+          <a:fillRef idx="0">
+            <a:schemeClr val="accent1"/>
+          </a:fillRef>
+          <a:effectRef idx="0">
+            <a:schemeClr val="accent1"/>
+          </a:effectRef>
+          <a:fontRef idx="minor">
+            <a:schemeClr val="tx1"/>
+          </a:fontRef>
+        </p:style>
+      </p:cxnSp>
+      <p:pic>
+        <p:nvPicPr>
+          <p:cNvPr id="168" name="Picture 167"/>
+          <p:cNvPicPr>
+            <a:picLocks noChangeAspect="1"/>
+          </p:cNvPicPr>
+          <p:nvPr/>
+        </p:nvPicPr>
+        <p:blipFill>
+          <a:blip r:embed="rId3"/>
+          <a:stretch>
+            <a:fillRect/>
+          </a:stretch>
+        </p:blipFill>
+        <p:spPr>
+          <a:xfrm>
+            <a:off x="5890769" y="1113737"/>
+            <a:ext cx="101600" cy="139700"/>
+          </a:xfrm>
+          <a:prstGeom prst="rect">
+            <a:avLst/>
+          </a:prstGeom>
+        </p:spPr>
+      </p:pic>
+      <p:grpSp>
+        <p:nvGrpSpPr>
+          <p:cNvPr id="91" name="Group 90"/>
+          <p:cNvGrpSpPr/>
+          <p:nvPr/>
+        </p:nvGrpSpPr>
+        <p:grpSpPr>
+          <a:xfrm rot="3600000">
+            <a:off x="5374366" y="1435096"/>
+            <a:ext cx="73152" cy="228164"/>
+            <a:chOff x="5949232" y="1821744"/>
+            <a:chExt cx="73152" cy="228164"/>
+          </a:xfrm>
+        </p:grpSpPr>
         <p:sp>
           <p:nvSpPr>
-            <p:cNvPr id="133" name="Oval 132"/>
+            <p:cNvPr id="169" name="Oval 168"/>
             <p:cNvSpPr/>
             <p:nvPr/>
           </p:nvSpPr>
           <p:spPr>
             <a:xfrm>
-              <a:off x="4310672" y="1212707"/>
-              <a:ext cx="108066" cy="108066"/>
-            </a:xfrm>
-            <a:prstGeom prst="ellipse">
-              <a:avLst/>
-            </a:prstGeom>
-            <a:solidFill>
-              <a:schemeClr val="bg2"/>
-            </a:solidFill>
-            <a:ln>
-              <a:solidFill>
-                <a:schemeClr val="tx1"/>
-              </a:solidFill>
-            </a:ln>
-          </p:spPr>
-          <p:style>
-            <a:lnRef idx="2">
-              <a:schemeClr val="accent1">
-                <a:shade val="50000"/>
-              </a:schemeClr>
-            </a:lnRef>
-            <a:fillRef idx="1">
-              <a:schemeClr val="accent1"/>
-            </a:fillRef>
-            <a:effectRef idx="0">
-              <a:schemeClr val="accent1"/>
-            </a:effectRef>
-            <a:fontRef idx="minor">
-              <a:schemeClr val="lt1"/>
-            </a:fontRef>
-          </p:style>
-          <p:txBody>
-            <a:bodyPr rtlCol="0" anchor="ctr"/>
-            <a:lstStyle/>
-            <a:p>
-              <a:pPr algn="ctr"/>
-              <a:endParaRPr lang="en-US"/>
-            </a:p>
-          </p:txBody>
-        </p:sp>
-        <p:sp>
-          <p:nvSpPr>
-            <p:cNvPr id="134" name="Oval 133"/>
-            <p:cNvSpPr/>
-            <p:nvPr/>
-          </p:nvSpPr>
-          <p:spPr>
-            <a:xfrm>
-              <a:off x="5780801" y="1256507"/>
-              <a:ext cx="108066" cy="108066"/>
-            </a:xfrm>
-            <a:prstGeom prst="ellipse">
-              <a:avLst/>
-            </a:prstGeom>
-            <a:solidFill>
-              <a:schemeClr val="bg2"/>
-            </a:solidFill>
-            <a:ln>
-              <a:solidFill>
-                <a:schemeClr val="tx1"/>
-              </a:solidFill>
-            </a:ln>
-          </p:spPr>
-          <p:style>
-            <a:lnRef idx="2">
-              <a:schemeClr val="accent1">
-                <a:shade val="50000"/>
-              </a:schemeClr>
-            </a:lnRef>
-            <a:fillRef idx="1">
-              <a:schemeClr val="accent1"/>
-            </a:fillRef>
-            <a:effectRef idx="0">
-              <a:schemeClr val="accent1"/>
-            </a:effectRef>
-            <a:fontRef idx="minor">
-              <a:schemeClr val="lt1"/>
-            </a:fontRef>
-          </p:style>
-          <p:txBody>
-            <a:bodyPr rtlCol="0" anchor="ctr"/>
-            <a:lstStyle/>
-            <a:p>
-              <a:pPr algn="ctr"/>
-              <a:endParaRPr lang="en-US"/>
-            </a:p>
-          </p:txBody>
-        </p:sp>
-        <p:sp>
-          <p:nvSpPr>
-            <p:cNvPr id="137" name="Oval 136"/>
-            <p:cNvSpPr/>
-            <p:nvPr/>
-          </p:nvSpPr>
-          <p:spPr>
-            <a:xfrm>
-              <a:off x="4327841" y="886313"/>
+              <a:off x="5949232" y="1821744"/>
               <a:ext cx="73152" cy="73152"/>
             </a:xfrm>
             <a:prstGeom prst="ellipse">
@@ -4351,15 +4988,66 @@
             </a:p>
           </p:txBody>
         </p:sp>
+        <p:cxnSp>
+          <p:nvCxnSpPr>
+            <p:cNvPr id="170" name="Straight Arrow Connector 169"/>
+            <p:cNvCxnSpPr/>
+            <p:nvPr/>
+          </p:nvCxnSpPr>
+          <p:spPr>
+            <a:xfrm>
+              <a:off x="5985808" y="1894896"/>
+              <a:ext cx="0" cy="155012"/>
+            </a:xfrm>
+            <a:prstGeom prst="straightConnector1">
+              <a:avLst/>
+            </a:prstGeom>
+            <a:ln w="12700">
+              <a:solidFill>
+                <a:schemeClr val="tx1"/>
+              </a:solidFill>
+              <a:tailEnd type="triangle"/>
+            </a:ln>
+          </p:spPr>
+          <p:style>
+            <a:lnRef idx="1">
+              <a:schemeClr val="accent1"/>
+            </a:lnRef>
+            <a:fillRef idx="0">
+              <a:schemeClr val="accent1"/>
+            </a:fillRef>
+            <a:effectRef idx="0">
+              <a:schemeClr val="accent1"/>
+            </a:effectRef>
+            <a:fontRef idx="minor">
+              <a:schemeClr val="tx1"/>
+            </a:fontRef>
+          </p:style>
+        </p:cxnSp>
+      </p:grpSp>
+      <p:grpSp>
+        <p:nvGrpSpPr>
+          <p:cNvPr id="172" name="Group 171"/>
+          <p:cNvGrpSpPr/>
+          <p:nvPr/>
+        </p:nvGrpSpPr>
+        <p:grpSpPr>
+          <a:xfrm rot="7200000">
+            <a:off x="5377673" y="964539"/>
+            <a:ext cx="73152" cy="228164"/>
+            <a:chOff x="5949232" y="1821744"/>
+            <a:chExt cx="73152" cy="228164"/>
+          </a:xfrm>
+        </p:grpSpPr>
         <p:sp>
           <p:nvSpPr>
-            <p:cNvPr id="138" name="Oval 137"/>
+            <p:cNvPr id="173" name="Oval 172"/>
             <p:cNvSpPr/>
             <p:nvPr/>
           </p:nvSpPr>
           <p:spPr>
             <a:xfrm>
-              <a:off x="4671978" y="1228354"/>
+              <a:off x="5949232" y="1821744"/>
               <a:ext cx="73152" cy="73152"/>
             </a:xfrm>
             <a:prstGeom prst="ellipse">
@@ -4399,15 +5087,66 @@
             </a:p>
           </p:txBody>
         </p:sp>
+        <p:cxnSp>
+          <p:nvCxnSpPr>
+            <p:cNvPr id="174" name="Straight Arrow Connector 173"/>
+            <p:cNvCxnSpPr/>
+            <p:nvPr/>
+          </p:nvCxnSpPr>
+          <p:spPr>
+            <a:xfrm>
+              <a:off x="5985808" y="1894896"/>
+              <a:ext cx="0" cy="155012"/>
+            </a:xfrm>
+            <a:prstGeom prst="straightConnector1">
+              <a:avLst/>
+            </a:prstGeom>
+            <a:ln w="12700">
+              <a:solidFill>
+                <a:schemeClr val="tx1"/>
+              </a:solidFill>
+              <a:tailEnd type="triangle"/>
+            </a:ln>
+          </p:spPr>
+          <p:style>
+            <a:lnRef idx="1">
+              <a:schemeClr val="accent1"/>
+            </a:lnRef>
+            <a:fillRef idx="0">
+              <a:schemeClr val="accent1"/>
+            </a:fillRef>
+            <a:effectRef idx="0">
+              <a:schemeClr val="accent1"/>
+            </a:effectRef>
+            <a:fontRef idx="minor">
+              <a:schemeClr val="tx1"/>
+            </a:fontRef>
+          </p:style>
+        </p:cxnSp>
+      </p:grpSp>
+      <p:grpSp>
+        <p:nvGrpSpPr>
+          <p:cNvPr id="175" name="Group 174"/>
+          <p:cNvGrpSpPr/>
+          <p:nvPr/>
+        </p:nvGrpSpPr>
+        <p:grpSpPr>
+          <a:xfrm rot="14400000">
+            <a:off x="6224840" y="964540"/>
+            <a:ext cx="73152" cy="228164"/>
+            <a:chOff x="5949232" y="1821744"/>
+            <a:chExt cx="73152" cy="228164"/>
+          </a:xfrm>
+        </p:grpSpPr>
         <p:sp>
           <p:nvSpPr>
-            <p:cNvPr id="139" name="Oval 138"/>
+            <p:cNvPr id="176" name="Oval 175"/>
             <p:cNvSpPr/>
             <p:nvPr/>
           </p:nvSpPr>
           <p:spPr>
             <a:xfrm>
-              <a:off x="3985584" y="1228354"/>
+              <a:off x="5949232" y="1821744"/>
               <a:ext cx="73152" cy="73152"/>
             </a:xfrm>
             <a:prstGeom prst="ellipse">
@@ -4447,15 +5186,66 @@
             </a:p>
           </p:txBody>
         </p:sp>
+        <p:cxnSp>
+          <p:nvCxnSpPr>
+            <p:cNvPr id="177" name="Straight Arrow Connector 176"/>
+            <p:cNvCxnSpPr/>
+            <p:nvPr/>
+          </p:nvCxnSpPr>
+          <p:spPr>
+            <a:xfrm>
+              <a:off x="5985808" y="1894896"/>
+              <a:ext cx="0" cy="155012"/>
+            </a:xfrm>
+            <a:prstGeom prst="straightConnector1">
+              <a:avLst/>
+            </a:prstGeom>
+            <a:ln w="12700">
+              <a:solidFill>
+                <a:schemeClr val="tx1"/>
+              </a:solidFill>
+              <a:tailEnd type="triangle"/>
+            </a:ln>
+          </p:spPr>
+          <p:style>
+            <a:lnRef idx="1">
+              <a:schemeClr val="accent1"/>
+            </a:lnRef>
+            <a:fillRef idx="0">
+              <a:schemeClr val="accent1"/>
+            </a:fillRef>
+            <a:effectRef idx="0">
+              <a:schemeClr val="accent1"/>
+            </a:effectRef>
+            <a:fontRef idx="minor">
+              <a:schemeClr val="tx1"/>
+            </a:fontRef>
+          </p:style>
+        </p:cxnSp>
+      </p:grpSp>
+      <p:grpSp>
+        <p:nvGrpSpPr>
+          <p:cNvPr id="178" name="Group 177"/>
+          <p:cNvGrpSpPr/>
+          <p:nvPr/>
+        </p:nvGrpSpPr>
+        <p:grpSpPr>
+          <a:xfrm rot="18000000">
+            <a:off x="6228636" y="1435095"/>
+            <a:ext cx="73152" cy="228164"/>
+            <a:chOff x="5949232" y="1821744"/>
+            <a:chExt cx="73152" cy="228164"/>
+          </a:xfrm>
+        </p:grpSpPr>
         <p:sp>
           <p:nvSpPr>
-            <p:cNvPr id="140" name="Oval 139"/>
+            <p:cNvPr id="179" name="Oval 178"/>
             <p:cNvSpPr/>
             <p:nvPr/>
           </p:nvSpPr>
           <p:spPr>
             <a:xfrm>
-              <a:off x="4330174" y="1574013"/>
+              <a:off x="5949232" y="1821744"/>
               <a:ext cx="73152" cy="73152"/>
             </a:xfrm>
             <a:prstGeom prst="ellipse">
@@ -4495,137 +5285,15 @@
             </a:p>
           </p:txBody>
         </p:sp>
-        <p:pic>
-          <p:nvPicPr>
-            <p:cNvPr id="79" name="Picture 78"/>
-            <p:cNvPicPr>
-              <a:picLocks noChangeAspect="1"/>
-            </p:cNvPicPr>
-            <p:nvPr/>
-          </p:nvPicPr>
-          <p:blipFill>
-            <a:blip r:embed="rId3"/>
-            <a:stretch>
-              <a:fillRect/>
-            </a:stretch>
-          </p:blipFill>
-          <p:spPr>
-            <a:xfrm>
-              <a:off x="4413224" y="1067801"/>
-              <a:ext cx="101600" cy="139700"/>
-            </a:xfrm>
-            <a:prstGeom prst="rect">
-              <a:avLst/>
-            </a:prstGeom>
-          </p:spPr>
-        </p:pic>
-        <p:pic>
-          <p:nvPicPr>
-            <p:cNvPr id="80" name="Picture 79"/>
-            <p:cNvPicPr>
-              <a:picLocks noChangeAspect="1"/>
-            </p:cNvPicPr>
-            <p:nvPr/>
-          </p:nvPicPr>
-          <p:blipFill>
-            <a:blip r:embed="rId4"/>
-            <a:stretch>
-              <a:fillRect/>
-            </a:stretch>
-          </p:blipFill>
-          <p:spPr>
-            <a:xfrm>
-              <a:off x="4788752" y="1095104"/>
-              <a:ext cx="114300" cy="101600"/>
-            </a:xfrm>
-            <a:prstGeom prst="rect">
-              <a:avLst/>
-            </a:prstGeom>
-          </p:spPr>
-        </p:pic>
-        <p:pic>
-          <p:nvPicPr>
-            <p:cNvPr id="145" name="Picture 144"/>
-            <p:cNvPicPr>
-              <a:picLocks noChangeAspect="1"/>
-            </p:cNvPicPr>
-            <p:nvPr/>
-          </p:nvPicPr>
-          <p:blipFill>
-            <a:blip r:embed="rId4"/>
-            <a:stretch>
-              <a:fillRect/>
-            </a:stretch>
-          </p:blipFill>
-          <p:spPr>
-            <a:xfrm>
-              <a:off x="3831116" y="1091170"/>
-              <a:ext cx="114300" cy="101600"/>
-            </a:xfrm>
-            <a:prstGeom prst="rect">
-              <a:avLst/>
-            </a:prstGeom>
-          </p:spPr>
-        </p:pic>
-        <p:pic>
-          <p:nvPicPr>
-            <p:cNvPr id="81" name="Picture 80"/>
-            <p:cNvPicPr>
-              <a:picLocks noChangeAspect="1"/>
-            </p:cNvPicPr>
-            <p:nvPr/>
-          </p:nvPicPr>
-          <p:blipFill>
-            <a:blip r:embed="rId5"/>
-            <a:stretch>
-              <a:fillRect/>
-            </a:stretch>
-          </p:blipFill>
-          <p:spPr>
-            <a:xfrm>
-              <a:off x="4428230" y="1696228"/>
-              <a:ext cx="88900" cy="101600"/>
-            </a:xfrm>
-            <a:prstGeom prst="rect">
-              <a:avLst/>
-            </a:prstGeom>
-          </p:spPr>
-        </p:pic>
-        <p:pic>
-          <p:nvPicPr>
-            <p:cNvPr id="147" name="Picture 146"/>
-            <p:cNvPicPr>
-              <a:picLocks noChangeAspect="1"/>
-            </p:cNvPicPr>
-            <p:nvPr/>
-          </p:nvPicPr>
-          <p:blipFill>
-            <a:blip r:embed="rId5"/>
-            <a:stretch>
-              <a:fillRect/>
-            </a:stretch>
-          </p:blipFill>
-          <p:spPr>
-            <a:xfrm>
-              <a:off x="4428230" y="760341"/>
-              <a:ext cx="88900" cy="101600"/>
-            </a:xfrm>
-            <a:prstGeom prst="rect">
-              <a:avLst/>
-            </a:prstGeom>
-          </p:spPr>
-        </p:pic>
         <p:cxnSp>
           <p:nvCxnSpPr>
-            <p:cNvPr id="83" name="Straight Arrow Connector 82"/>
-            <p:cNvCxnSpPr>
-              <a:stCxn id="140" idx="4"/>
-            </p:cNvCxnSpPr>
+            <p:cNvPr id="180" name="Straight Arrow Connector 179"/>
+            <p:cNvCxnSpPr/>
             <p:nvPr/>
           </p:nvCxnSpPr>
           <p:spPr>
             <a:xfrm>
-              <a:off x="4366750" y="1647165"/>
+              <a:off x="5985808" y="1894896"/>
               <a:ext cx="0" cy="155012"/>
             </a:xfrm>
             <a:prstGeom prst="straightConnector1">
@@ -4653,704 +5321,6 @@
             </a:fontRef>
           </p:style>
         </p:cxnSp>
-        <p:cxnSp>
-          <p:nvCxnSpPr>
-            <p:cNvPr id="152" name="Straight Arrow Connector 151"/>
-            <p:cNvCxnSpPr/>
-            <p:nvPr/>
-          </p:nvCxnSpPr>
-          <p:spPr>
-            <a:xfrm flipH="1" flipV="1">
-              <a:off x="4365113" y="736995"/>
-              <a:ext cx="0" cy="155448"/>
-            </a:xfrm>
-            <a:prstGeom prst="straightConnector1">
-              <a:avLst/>
-            </a:prstGeom>
-            <a:ln w="12700">
-              <a:solidFill>
-                <a:schemeClr val="tx1"/>
-              </a:solidFill>
-              <a:tailEnd type="triangle"/>
-            </a:ln>
-          </p:spPr>
-          <p:style>
-            <a:lnRef idx="1">
-              <a:schemeClr val="accent1"/>
-            </a:lnRef>
-            <a:fillRef idx="0">
-              <a:schemeClr val="accent1"/>
-            </a:fillRef>
-            <a:effectRef idx="0">
-              <a:schemeClr val="accent1"/>
-            </a:effectRef>
-            <a:fontRef idx="minor">
-              <a:schemeClr val="tx1"/>
-            </a:fontRef>
-          </p:style>
-        </p:cxnSp>
-        <p:cxnSp>
-          <p:nvCxnSpPr>
-            <p:cNvPr id="155" name="Straight Arrow Connector 154"/>
-            <p:cNvCxnSpPr>
-              <a:stCxn id="138" idx="6"/>
-            </p:cNvCxnSpPr>
-            <p:nvPr/>
-          </p:nvCxnSpPr>
-          <p:spPr>
-            <a:xfrm>
-              <a:off x="4745130" y="1264930"/>
-              <a:ext cx="154853" cy="0"/>
-            </a:xfrm>
-            <a:prstGeom prst="straightConnector1">
-              <a:avLst/>
-            </a:prstGeom>
-            <a:ln w="12700">
-              <a:solidFill>
-                <a:schemeClr val="tx1"/>
-              </a:solidFill>
-              <a:tailEnd type="triangle"/>
-            </a:ln>
-          </p:spPr>
-          <p:style>
-            <a:lnRef idx="1">
-              <a:schemeClr val="accent1"/>
-            </a:lnRef>
-            <a:fillRef idx="0">
-              <a:schemeClr val="accent1"/>
-            </a:fillRef>
-            <a:effectRef idx="0">
-              <a:schemeClr val="accent1"/>
-            </a:effectRef>
-            <a:fontRef idx="minor">
-              <a:schemeClr val="tx1"/>
-            </a:fontRef>
-          </p:style>
-        </p:cxnSp>
-        <p:cxnSp>
-          <p:nvCxnSpPr>
-            <p:cNvPr id="158" name="Straight Arrow Connector 157"/>
-            <p:cNvCxnSpPr/>
-            <p:nvPr/>
-          </p:nvCxnSpPr>
-          <p:spPr>
-            <a:xfrm flipH="1">
-              <a:off x="3829443" y="1265913"/>
-              <a:ext cx="156141" cy="0"/>
-            </a:xfrm>
-            <a:prstGeom prst="straightConnector1">
-              <a:avLst/>
-            </a:prstGeom>
-            <a:ln w="12700">
-              <a:solidFill>
-                <a:schemeClr val="tx1"/>
-              </a:solidFill>
-              <a:tailEnd type="triangle"/>
-            </a:ln>
-          </p:spPr>
-          <p:style>
-            <a:lnRef idx="1">
-              <a:schemeClr val="accent1"/>
-            </a:lnRef>
-            <a:fillRef idx="0">
-              <a:schemeClr val="accent1"/>
-            </a:fillRef>
-            <a:effectRef idx="0">
-              <a:schemeClr val="accent1"/>
-            </a:effectRef>
-            <a:fontRef idx="minor">
-              <a:schemeClr val="tx1"/>
-            </a:fontRef>
-          </p:style>
-        </p:cxnSp>
-        <p:sp>
-          <p:nvSpPr>
-            <p:cNvPr id="164" name="Oval 163"/>
-            <p:cNvSpPr/>
-            <p:nvPr/>
-          </p:nvSpPr>
-          <p:spPr>
-            <a:xfrm>
-              <a:off x="5796136" y="890435"/>
-              <a:ext cx="73152" cy="73152"/>
-            </a:xfrm>
-            <a:prstGeom prst="ellipse">
-              <a:avLst/>
-            </a:prstGeom>
-            <a:solidFill>
-              <a:schemeClr val="bg2"/>
-            </a:solidFill>
-            <a:ln>
-              <a:solidFill>
-                <a:schemeClr val="tx1"/>
-              </a:solidFill>
-            </a:ln>
-          </p:spPr>
-          <p:style>
-            <a:lnRef idx="2">
-              <a:schemeClr val="accent1">
-                <a:shade val="50000"/>
-              </a:schemeClr>
-            </a:lnRef>
-            <a:fillRef idx="1">
-              <a:schemeClr val="accent1"/>
-            </a:fillRef>
-            <a:effectRef idx="0">
-              <a:schemeClr val="accent1"/>
-            </a:effectRef>
-            <a:fontRef idx="minor">
-              <a:schemeClr val="lt1"/>
-            </a:fontRef>
-          </p:style>
-          <p:txBody>
-            <a:bodyPr rtlCol="0" anchor="ctr"/>
-            <a:lstStyle/>
-            <a:p>
-              <a:pPr algn="ctr"/>
-              <a:endParaRPr lang="en-US"/>
-            </a:p>
-          </p:txBody>
-        </p:sp>
-        <p:cxnSp>
-          <p:nvCxnSpPr>
-            <p:cNvPr id="165" name="Straight Arrow Connector 164"/>
-            <p:cNvCxnSpPr/>
-            <p:nvPr/>
-          </p:nvCxnSpPr>
-          <p:spPr>
-            <a:xfrm flipH="1" flipV="1">
-              <a:off x="5833408" y="741117"/>
-              <a:ext cx="0" cy="155448"/>
-            </a:xfrm>
-            <a:prstGeom prst="straightConnector1">
-              <a:avLst/>
-            </a:prstGeom>
-            <a:ln w="12700">
-              <a:solidFill>
-                <a:schemeClr val="tx1"/>
-              </a:solidFill>
-              <a:tailEnd type="triangle"/>
-            </a:ln>
-          </p:spPr>
-          <p:style>
-            <a:lnRef idx="1">
-              <a:schemeClr val="accent1"/>
-            </a:lnRef>
-            <a:fillRef idx="0">
-              <a:schemeClr val="accent1"/>
-            </a:fillRef>
-            <a:effectRef idx="0">
-              <a:schemeClr val="accent1"/>
-            </a:effectRef>
-            <a:fontRef idx="minor">
-              <a:schemeClr val="tx1"/>
-            </a:fontRef>
-          </p:style>
-        </p:cxnSp>
-        <p:sp>
-          <p:nvSpPr>
-            <p:cNvPr id="166" name="Oval 165"/>
-            <p:cNvSpPr/>
-            <p:nvPr/>
-          </p:nvSpPr>
-          <p:spPr>
-            <a:xfrm>
-              <a:off x="5796832" y="1669344"/>
-              <a:ext cx="73152" cy="73152"/>
-            </a:xfrm>
-            <a:prstGeom prst="ellipse">
-              <a:avLst/>
-            </a:prstGeom>
-            <a:solidFill>
-              <a:schemeClr val="bg2"/>
-            </a:solidFill>
-            <a:ln>
-              <a:solidFill>
-                <a:schemeClr val="tx1"/>
-              </a:solidFill>
-            </a:ln>
-          </p:spPr>
-          <p:style>
-            <a:lnRef idx="2">
-              <a:schemeClr val="accent1">
-                <a:shade val="50000"/>
-              </a:schemeClr>
-            </a:lnRef>
-            <a:fillRef idx="1">
-              <a:schemeClr val="accent1"/>
-            </a:fillRef>
-            <a:effectRef idx="0">
-              <a:schemeClr val="accent1"/>
-            </a:effectRef>
-            <a:fontRef idx="minor">
-              <a:schemeClr val="lt1"/>
-            </a:fontRef>
-          </p:style>
-          <p:txBody>
-            <a:bodyPr rtlCol="0" anchor="ctr"/>
-            <a:lstStyle/>
-            <a:p>
-              <a:pPr algn="ctr"/>
-              <a:endParaRPr lang="en-US"/>
-            </a:p>
-          </p:txBody>
-        </p:sp>
-        <p:cxnSp>
-          <p:nvCxnSpPr>
-            <p:cNvPr id="167" name="Straight Arrow Connector 166"/>
-            <p:cNvCxnSpPr/>
-            <p:nvPr/>
-          </p:nvCxnSpPr>
-          <p:spPr>
-            <a:xfrm>
-              <a:off x="5833408" y="1742496"/>
-              <a:ext cx="0" cy="155012"/>
-            </a:xfrm>
-            <a:prstGeom prst="straightConnector1">
-              <a:avLst/>
-            </a:prstGeom>
-            <a:ln w="12700">
-              <a:solidFill>
-                <a:schemeClr val="tx1"/>
-              </a:solidFill>
-              <a:tailEnd type="triangle"/>
-            </a:ln>
-          </p:spPr>
-          <p:style>
-            <a:lnRef idx="1">
-              <a:schemeClr val="accent1"/>
-            </a:lnRef>
-            <a:fillRef idx="0">
-              <a:schemeClr val="accent1"/>
-            </a:fillRef>
-            <a:effectRef idx="0">
-              <a:schemeClr val="accent1"/>
-            </a:effectRef>
-            <a:fontRef idx="minor">
-              <a:schemeClr val="tx1"/>
-            </a:fontRef>
-          </p:style>
-        </p:cxnSp>
-        <p:pic>
-          <p:nvPicPr>
-            <p:cNvPr id="168" name="Picture 167"/>
-            <p:cNvPicPr>
-              <a:picLocks noChangeAspect="1"/>
-            </p:cNvPicPr>
-            <p:nvPr/>
-          </p:nvPicPr>
-          <p:blipFill>
-            <a:blip r:embed="rId3"/>
-            <a:stretch>
-              <a:fillRect/>
-            </a:stretch>
-          </p:blipFill>
-          <p:spPr>
-            <a:xfrm>
-              <a:off x="5890769" y="1113737"/>
-              <a:ext cx="101600" cy="139700"/>
-            </a:xfrm>
-            <a:prstGeom prst="rect">
-              <a:avLst/>
-            </a:prstGeom>
-          </p:spPr>
-        </p:pic>
-        <p:grpSp>
-          <p:nvGrpSpPr>
-            <p:cNvPr id="91" name="Group 90"/>
-            <p:cNvGrpSpPr/>
-            <p:nvPr/>
-          </p:nvGrpSpPr>
-          <p:grpSpPr>
-            <a:xfrm rot="3600000">
-              <a:off x="5374366" y="1435096"/>
-              <a:ext cx="73152" cy="228164"/>
-              <a:chOff x="5949232" y="1821744"/>
-              <a:chExt cx="73152" cy="228164"/>
-            </a:xfrm>
-          </p:grpSpPr>
-          <p:sp>
-            <p:nvSpPr>
-              <p:cNvPr id="169" name="Oval 168"/>
-              <p:cNvSpPr/>
-              <p:nvPr/>
-            </p:nvSpPr>
-            <p:spPr>
-              <a:xfrm>
-                <a:off x="5949232" y="1821744"/>
-                <a:ext cx="73152" cy="73152"/>
-              </a:xfrm>
-              <a:prstGeom prst="ellipse">
-                <a:avLst/>
-              </a:prstGeom>
-              <a:solidFill>
-                <a:schemeClr val="bg2"/>
-              </a:solidFill>
-              <a:ln>
-                <a:solidFill>
-                  <a:schemeClr val="tx1"/>
-                </a:solidFill>
-              </a:ln>
-            </p:spPr>
-            <p:style>
-              <a:lnRef idx="2">
-                <a:schemeClr val="accent1">
-                  <a:shade val="50000"/>
-                </a:schemeClr>
-              </a:lnRef>
-              <a:fillRef idx="1">
-                <a:schemeClr val="accent1"/>
-              </a:fillRef>
-              <a:effectRef idx="0">
-                <a:schemeClr val="accent1"/>
-              </a:effectRef>
-              <a:fontRef idx="minor">
-                <a:schemeClr val="lt1"/>
-              </a:fontRef>
-            </p:style>
-            <p:txBody>
-              <a:bodyPr rtlCol="0" anchor="ctr"/>
-              <a:lstStyle/>
-              <a:p>
-                <a:pPr algn="ctr"/>
-                <a:endParaRPr lang="en-US"/>
-              </a:p>
-            </p:txBody>
-          </p:sp>
-          <p:cxnSp>
-            <p:nvCxnSpPr>
-              <p:cNvPr id="170" name="Straight Arrow Connector 169"/>
-              <p:cNvCxnSpPr/>
-              <p:nvPr/>
-            </p:nvCxnSpPr>
-            <p:spPr>
-              <a:xfrm>
-                <a:off x="5985808" y="1894896"/>
-                <a:ext cx="0" cy="155012"/>
-              </a:xfrm>
-              <a:prstGeom prst="straightConnector1">
-                <a:avLst/>
-              </a:prstGeom>
-              <a:ln w="12700">
-                <a:solidFill>
-                  <a:schemeClr val="tx1"/>
-                </a:solidFill>
-                <a:tailEnd type="triangle"/>
-              </a:ln>
-            </p:spPr>
-            <p:style>
-              <a:lnRef idx="1">
-                <a:schemeClr val="accent1"/>
-              </a:lnRef>
-              <a:fillRef idx="0">
-                <a:schemeClr val="accent1"/>
-              </a:fillRef>
-              <a:effectRef idx="0">
-                <a:schemeClr val="accent1"/>
-              </a:effectRef>
-              <a:fontRef idx="minor">
-                <a:schemeClr val="tx1"/>
-              </a:fontRef>
-            </p:style>
-          </p:cxnSp>
-        </p:grpSp>
-        <p:grpSp>
-          <p:nvGrpSpPr>
-            <p:cNvPr id="172" name="Group 171"/>
-            <p:cNvGrpSpPr/>
-            <p:nvPr/>
-          </p:nvGrpSpPr>
-          <p:grpSpPr>
-            <a:xfrm rot="7200000">
-              <a:off x="5377673" y="964539"/>
-              <a:ext cx="73152" cy="228164"/>
-              <a:chOff x="5949232" y="1821744"/>
-              <a:chExt cx="73152" cy="228164"/>
-            </a:xfrm>
-          </p:grpSpPr>
-          <p:sp>
-            <p:nvSpPr>
-              <p:cNvPr id="173" name="Oval 172"/>
-              <p:cNvSpPr/>
-              <p:nvPr/>
-            </p:nvSpPr>
-            <p:spPr>
-              <a:xfrm>
-                <a:off x="5949232" y="1821744"/>
-                <a:ext cx="73152" cy="73152"/>
-              </a:xfrm>
-              <a:prstGeom prst="ellipse">
-                <a:avLst/>
-              </a:prstGeom>
-              <a:solidFill>
-                <a:schemeClr val="bg2"/>
-              </a:solidFill>
-              <a:ln>
-                <a:solidFill>
-                  <a:schemeClr val="tx1"/>
-                </a:solidFill>
-              </a:ln>
-            </p:spPr>
-            <p:style>
-              <a:lnRef idx="2">
-                <a:schemeClr val="accent1">
-                  <a:shade val="50000"/>
-                </a:schemeClr>
-              </a:lnRef>
-              <a:fillRef idx="1">
-                <a:schemeClr val="accent1"/>
-              </a:fillRef>
-              <a:effectRef idx="0">
-                <a:schemeClr val="accent1"/>
-              </a:effectRef>
-              <a:fontRef idx="minor">
-                <a:schemeClr val="lt1"/>
-              </a:fontRef>
-            </p:style>
-            <p:txBody>
-              <a:bodyPr rtlCol="0" anchor="ctr"/>
-              <a:lstStyle/>
-              <a:p>
-                <a:pPr algn="ctr"/>
-                <a:endParaRPr lang="en-US"/>
-              </a:p>
-            </p:txBody>
-          </p:sp>
-          <p:cxnSp>
-            <p:nvCxnSpPr>
-              <p:cNvPr id="174" name="Straight Arrow Connector 173"/>
-              <p:cNvCxnSpPr/>
-              <p:nvPr/>
-            </p:nvCxnSpPr>
-            <p:spPr>
-              <a:xfrm>
-                <a:off x="5985808" y="1894896"/>
-                <a:ext cx="0" cy="155012"/>
-              </a:xfrm>
-              <a:prstGeom prst="straightConnector1">
-                <a:avLst/>
-              </a:prstGeom>
-              <a:ln w="12700">
-                <a:solidFill>
-                  <a:schemeClr val="tx1"/>
-                </a:solidFill>
-                <a:tailEnd type="triangle"/>
-              </a:ln>
-            </p:spPr>
-            <p:style>
-              <a:lnRef idx="1">
-                <a:schemeClr val="accent1"/>
-              </a:lnRef>
-              <a:fillRef idx="0">
-                <a:schemeClr val="accent1"/>
-              </a:fillRef>
-              <a:effectRef idx="0">
-                <a:schemeClr val="accent1"/>
-              </a:effectRef>
-              <a:fontRef idx="minor">
-                <a:schemeClr val="tx1"/>
-              </a:fontRef>
-            </p:style>
-          </p:cxnSp>
-        </p:grpSp>
-        <p:grpSp>
-          <p:nvGrpSpPr>
-            <p:cNvPr id="175" name="Group 174"/>
-            <p:cNvGrpSpPr/>
-            <p:nvPr/>
-          </p:nvGrpSpPr>
-          <p:grpSpPr>
-            <a:xfrm rot="14400000">
-              <a:off x="6224840" y="964540"/>
-              <a:ext cx="73152" cy="228164"/>
-              <a:chOff x="5949232" y="1821744"/>
-              <a:chExt cx="73152" cy="228164"/>
-            </a:xfrm>
-          </p:grpSpPr>
-          <p:sp>
-            <p:nvSpPr>
-              <p:cNvPr id="176" name="Oval 175"/>
-              <p:cNvSpPr/>
-              <p:nvPr/>
-            </p:nvSpPr>
-            <p:spPr>
-              <a:xfrm>
-                <a:off x="5949232" y="1821744"/>
-                <a:ext cx="73152" cy="73152"/>
-              </a:xfrm>
-              <a:prstGeom prst="ellipse">
-                <a:avLst/>
-              </a:prstGeom>
-              <a:solidFill>
-                <a:schemeClr val="bg2"/>
-              </a:solidFill>
-              <a:ln>
-                <a:solidFill>
-                  <a:schemeClr val="tx1"/>
-                </a:solidFill>
-              </a:ln>
-            </p:spPr>
-            <p:style>
-              <a:lnRef idx="2">
-                <a:schemeClr val="accent1">
-                  <a:shade val="50000"/>
-                </a:schemeClr>
-              </a:lnRef>
-              <a:fillRef idx="1">
-                <a:schemeClr val="accent1"/>
-              </a:fillRef>
-              <a:effectRef idx="0">
-                <a:schemeClr val="accent1"/>
-              </a:effectRef>
-              <a:fontRef idx="minor">
-                <a:schemeClr val="lt1"/>
-              </a:fontRef>
-            </p:style>
-            <p:txBody>
-              <a:bodyPr rtlCol="0" anchor="ctr"/>
-              <a:lstStyle/>
-              <a:p>
-                <a:pPr algn="ctr"/>
-                <a:endParaRPr lang="en-US"/>
-              </a:p>
-            </p:txBody>
-          </p:sp>
-          <p:cxnSp>
-            <p:nvCxnSpPr>
-              <p:cNvPr id="177" name="Straight Arrow Connector 176"/>
-              <p:cNvCxnSpPr/>
-              <p:nvPr/>
-            </p:nvCxnSpPr>
-            <p:spPr>
-              <a:xfrm>
-                <a:off x="5985808" y="1894896"/>
-                <a:ext cx="0" cy="155012"/>
-              </a:xfrm>
-              <a:prstGeom prst="straightConnector1">
-                <a:avLst/>
-              </a:prstGeom>
-              <a:ln w="12700">
-                <a:solidFill>
-                  <a:schemeClr val="tx1"/>
-                </a:solidFill>
-                <a:tailEnd type="triangle"/>
-              </a:ln>
-            </p:spPr>
-            <p:style>
-              <a:lnRef idx="1">
-                <a:schemeClr val="accent1"/>
-              </a:lnRef>
-              <a:fillRef idx="0">
-                <a:schemeClr val="accent1"/>
-              </a:fillRef>
-              <a:effectRef idx="0">
-                <a:schemeClr val="accent1"/>
-              </a:effectRef>
-              <a:fontRef idx="minor">
-                <a:schemeClr val="tx1"/>
-              </a:fontRef>
-            </p:style>
-          </p:cxnSp>
-        </p:grpSp>
-        <p:grpSp>
-          <p:nvGrpSpPr>
-            <p:cNvPr id="178" name="Group 177"/>
-            <p:cNvGrpSpPr/>
-            <p:nvPr/>
-          </p:nvGrpSpPr>
-          <p:grpSpPr>
-            <a:xfrm rot="18000000">
-              <a:off x="6228636" y="1435095"/>
-              <a:ext cx="73152" cy="228164"/>
-              <a:chOff x="5949232" y="1821744"/>
-              <a:chExt cx="73152" cy="228164"/>
-            </a:xfrm>
-          </p:grpSpPr>
-          <p:sp>
-            <p:nvSpPr>
-              <p:cNvPr id="179" name="Oval 178"/>
-              <p:cNvSpPr/>
-              <p:nvPr/>
-            </p:nvSpPr>
-            <p:spPr>
-              <a:xfrm>
-                <a:off x="5949232" y="1821744"/>
-                <a:ext cx="73152" cy="73152"/>
-              </a:xfrm>
-              <a:prstGeom prst="ellipse">
-                <a:avLst/>
-              </a:prstGeom>
-              <a:solidFill>
-                <a:schemeClr val="bg2"/>
-              </a:solidFill>
-              <a:ln>
-                <a:solidFill>
-                  <a:schemeClr val="tx1"/>
-                </a:solidFill>
-              </a:ln>
-            </p:spPr>
-            <p:style>
-              <a:lnRef idx="2">
-                <a:schemeClr val="accent1">
-                  <a:shade val="50000"/>
-                </a:schemeClr>
-              </a:lnRef>
-              <a:fillRef idx="1">
-                <a:schemeClr val="accent1"/>
-              </a:fillRef>
-              <a:effectRef idx="0">
-                <a:schemeClr val="accent1"/>
-              </a:effectRef>
-              <a:fontRef idx="minor">
-                <a:schemeClr val="lt1"/>
-              </a:fontRef>
-            </p:style>
-            <p:txBody>
-              <a:bodyPr rtlCol="0" anchor="ctr"/>
-              <a:lstStyle/>
-              <a:p>
-                <a:pPr algn="ctr"/>
-                <a:endParaRPr lang="en-US"/>
-              </a:p>
-            </p:txBody>
-          </p:sp>
-          <p:cxnSp>
-            <p:nvCxnSpPr>
-              <p:cNvPr id="180" name="Straight Arrow Connector 179"/>
-              <p:cNvCxnSpPr/>
-              <p:nvPr/>
-            </p:nvCxnSpPr>
-            <p:spPr>
-              <a:xfrm>
-                <a:off x="5985808" y="1894896"/>
-                <a:ext cx="0" cy="155012"/>
-              </a:xfrm>
-              <a:prstGeom prst="straightConnector1">
-                <a:avLst/>
-              </a:prstGeom>
-              <a:ln w="12700">
-                <a:solidFill>
-                  <a:schemeClr val="tx1"/>
-                </a:solidFill>
-                <a:tailEnd type="triangle"/>
-              </a:ln>
-            </p:spPr>
-            <p:style>
-              <a:lnRef idx="1">
-                <a:schemeClr val="accent1"/>
-              </a:lnRef>
-              <a:fillRef idx="0">
-                <a:schemeClr val="accent1"/>
-              </a:fillRef>
-              <a:effectRef idx="0">
-                <a:schemeClr val="accent1"/>
-              </a:effectRef>
-              <a:fontRef idx="minor">
-                <a:schemeClr val="tx1"/>
-              </a:fontRef>
-            </p:style>
-          </p:cxnSp>
-        </p:grpSp>
       </p:grpSp>
       <p:cxnSp>
         <p:nvCxnSpPr>
@@ -5366,7 +5336,7 @@
           <a:prstGeom prst="line">
             <a:avLst/>
           </a:prstGeom>
-          <a:ln>
+          <a:ln w="19050">
             <a:solidFill>
               <a:schemeClr val="tx1"/>
             </a:solidFill>
@@ -5401,7 +5371,7 @@
           <a:prstGeom prst="line">
             <a:avLst/>
           </a:prstGeom>
-          <a:ln>
+          <a:ln w="19050">
             <a:solidFill>
               <a:schemeClr val="tx1"/>
             </a:solidFill>
@@ -5436,7 +5406,7 @@
           <a:prstGeom prst="line">
             <a:avLst/>
           </a:prstGeom>
-          <a:ln>
+          <a:ln w="19050">
             <a:solidFill>
               <a:schemeClr val="tx1"/>
             </a:solidFill>
@@ -5471,7 +5441,7 @@
           <a:prstGeom prst="line">
             <a:avLst/>
           </a:prstGeom>
-          <a:ln>
+          <a:ln w="19050">
             <a:solidFill>
               <a:schemeClr val="tx1"/>
             </a:solidFill>
@@ -5521,7 +5491,7 @@
               <a:avLst/>
             </a:prstGeom>
             <a:noFill/>
-            <a:ln w="6350">
+            <a:ln w="19050">
               <a:solidFill>
                 <a:schemeClr val="tx1"/>
               </a:solidFill>
@@ -5566,7 +5536,7 @@
             <a:prstGeom prst="line">
               <a:avLst/>
             </a:prstGeom>
-            <a:ln w="6350">
+            <a:ln w="19050">
               <a:solidFill>
                 <a:schemeClr val="tx1"/>
               </a:solidFill>
@@ -5601,7 +5571,7 @@
             <a:prstGeom prst="line">
               <a:avLst/>
             </a:prstGeom>
-            <a:ln w="6350">
+            <a:ln w="19050">
               <a:solidFill>
                 <a:schemeClr val="tx1"/>
               </a:solidFill>
@@ -5636,7 +5606,7 @@
             <a:prstGeom prst="line">
               <a:avLst/>
             </a:prstGeom>
-            <a:ln w="6350">
+            <a:ln w="19050">
               <a:solidFill>
                 <a:schemeClr val="tx1"/>
               </a:solidFill>
@@ -5671,7 +5641,7 @@
             <a:prstGeom prst="line">
               <a:avLst/>
             </a:prstGeom>
-            <a:ln w="6350">
+            <a:ln w="19050">
               <a:solidFill>
                 <a:schemeClr val="tx1"/>
               </a:solidFill>
@@ -5706,7 +5676,7 @@
             <a:prstGeom prst="line">
               <a:avLst/>
             </a:prstGeom>
-            <a:ln w="6350">
+            <a:ln w="19050">
               <a:solidFill>
                 <a:schemeClr val="tx1"/>
               </a:solidFill>
@@ -5741,7 +5711,7 @@
             <a:prstGeom prst="line">
               <a:avLst/>
             </a:prstGeom>
-            <a:ln w="6350">
+            <a:ln w="19050">
               <a:solidFill>
                 <a:schemeClr val="tx1"/>
               </a:solidFill>
@@ -7045,7 +7015,7 @@
           <a:prstGeom prst="line">
             <a:avLst/>
           </a:prstGeom>
-          <a:ln>
+          <a:ln w="19050">
             <a:solidFill>
               <a:schemeClr val="tx1"/>
             </a:solidFill>
@@ -7080,7 +7050,7 @@
           <a:prstGeom prst="line">
             <a:avLst/>
           </a:prstGeom>
-          <a:ln>
+          <a:ln w="19050">
             <a:solidFill>
               <a:schemeClr val="tx1"/>
             </a:solidFill>
@@ -7115,7 +7085,7 @@
           <a:prstGeom prst="line">
             <a:avLst/>
           </a:prstGeom>
-          <a:ln>
+          <a:ln w="19050">
             <a:solidFill>
               <a:schemeClr val="tx1"/>
             </a:solidFill>
@@ -7150,7 +7120,7 @@
           <a:prstGeom prst="line">
             <a:avLst/>
           </a:prstGeom>
-          <a:ln>
+          <a:ln w="19050">
             <a:solidFill>
               <a:schemeClr val="tx1"/>
             </a:solidFill>
@@ -7200,7 +7170,7 @@
               <a:avLst/>
             </a:prstGeom>
             <a:noFill/>
-            <a:ln w="6350">
+            <a:ln w="19050">
               <a:solidFill>
                 <a:schemeClr val="tx1"/>
               </a:solidFill>
@@ -7247,7 +7217,7 @@
             <a:prstGeom prst="line">
               <a:avLst/>
             </a:prstGeom>
-            <a:ln w="6350">
+            <a:ln w="19050">
               <a:solidFill>
                 <a:schemeClr val="tx1"/>
               </a:solidFill>
@@ -7282,7 +7252,7 @@
             <a:prstGeom prst="line">
               <a:avLst/>
             </a:prstGeom>
-            <a:ln w="6350">
+            <a:ln w="19050">
               <a:solidFill>
                 <a:schemeClr val="tx1"/>
               </a:solidFill>
@@ -7319,7 +7289,7 @@
             <a:prstGeom prst="line">
               <a:avLst/>
             </a:prstGeom>
-            <a:ln w="6350">
+            <a:ln w="19050">
               <a:solidFill>
                 <a:schemeClr val="tx1"/>
               </a:solidFill>
@@ -7356,7 +7326,7 @@
             <a:prstGeom prst="line">
               <a:avLst/>
             </a:prstGeom>
-            <a:ln w="6350">
+            <a:ln w="19050">
               <a:solidFill>
                 <a:schemeClr val="tx1"/>
               </a:solidFill>
@@ -7393,7 +7363,7 @@
             <a:prstGeom prst="line">
               <a:avLst/>
             </a:prstGeom>
-            <a:ln w="6350">
+            <a:ln w="19050">
               <a:solidFill>
                 <a:schemeClr val="tx1"/>
               </a:solidFill>
@@ -7430,7 +7400,7 @@
             <a:prstGeom prst="line">
               <a:avLst/>
             </a:prstGeom>
-            <a:ln w="6350">
+            <a:ln w="19050">
               <a:solidFill>
                 <a:schemeClr val="tx1"/>
               </a:solidFill>

</xml_diff>